<commit_message>
[docs]: reading 1 presentation update
</commit_message>
<xml_diff>
--- a/template/reading.pptx
+++ b/template/reading.pptx
@@ -2,13 +2,11 @@
 <file path=ppt/presentation.xml><?xml version="1.0" encoding="utf-8"?>
 <p:presentation xmlns:a="http://schemas.openxmlformats.org/drawingml/2006/main" xmlns:r="http://schemas.openxmlformats.org/officeDocument/2006/relationships" xmlns:p="http://schemas.openxmlformats.org/presentationml/2006/main" saveSubsetFonts="1" autoCompressPictures="0">
   <p:sldMasterIdLst>
-    <p:sldMasterId id="2147483673" r:id="rId1"/>
+    <p:sldMasterId id="2147483674" r:id="rId1"/>
   </p:sldMasterIdLst>
   <p:sldIdLst>
     <p:sldId id="256" r:id="rId2"/>
     <p:sldId id="257" r:id="rId3"/>
-    <p:sldId id="258" r:id="rId4"/>
-    <p:sldId id="259" r:id="rId5"/>
   </p:sldIdLst>
   <p:sldSz cx="12192000" cy="6858000"/>
   <p:notesSz cx="6858000" cy="9144000"/>
@@ -107,6 +105,11 @@
       </a:defRPr>
     </a:lvl9pPr>
   </p:defaultTextStyle>
+  <p:extLst>
+    <p:ext uri="{EFAFB233-063F-42B5-8137-9DF3F51BA10A}">
+      <p15:sldGuideLst xmlns:p15="http://schemas.microsoft.com/office/powerpoint/2012/main"/>
+    </p:ext>
+  </p:extLst>
 </p:presentation>
 </file>
 
@@ -132,7 +135,7 @@
           <p:cNvPr id="2" name="Title 1">
             <a:extLst>
               <a:ext uri="{FF2B5EF4-FFF2-40B4-BE49-F238E27FC236}">
-                <a16:creationId xmlns:a16="http://schemas.microsoft.com/office/drawing/2014/main" id="{E4336E9A-8E96-CD8C-7598-F87632CD81CF}"/>
+                <a16:creationId xmlns:a16="http://schemas.microsoft.com/office/drawing/2014/main" id="{2F047740-53AE-999F-F087-01BBD6FC287D}"/>
               </a:ext>
             </a:extLst>
           </p:cNvPr>
@@ -145,17 +148,15 @@
         </p:nvSpPr>
         <p:spPr>
           <a:xfrm>
-            <a:off x="2301923" y="1122363"/>
-            <a:ext cx="7588155" cy="2621154"/>
+            <a:off x="1524000" y="1122363"/>
+            <a:ext cx="9144000" cy="2387600"/>
           </a:xfrm>
         </p:spPr>
         <p:txBody>
-          <a:bodyPr anchor="b">
-            <a:normAutofit/>
-          </a:bodyPr>
+          <a:bodyPr anchor="b"/>
           <a:lstStyle>
             <a:lvl1pPr algn="ctr">
-              <a:defRPr sz="4000"/>
+              <a:defRPr sz="6000"/>
             </a:lvl1pPr>
           </a:lstStyle>
           <a:p>
@@ -163,7 +164,6 @@
               <a:rPr lang="en-US"/>
               <a:t>Click to edit Master title style</a:t>
             </a:r>
-            <a:endParaRPr lang="en-US" dirty="0"/>
           </a:p>
         </p:txBody>
       </p:sp>
@@ -172,7 +172,7 @@
           <p:cNvPr id="3" name="Subtitle 2">
             <a:extLst>
               <a:ext uri="{FF2B5EF4-FFF2-40B4-BE49-F238E27FC236}">
-                <a16:creationId xmlns:a16="http://schemas.microsoft.com/office/drawing/2014/main" id="{2BDC76B8-60F6-62D3-9F73-E81662203017}"/>
+                <a16:creationId xmlns:a16="http://schemas.microsoft.com/office/drawing/2014/main" id="{14E1FD06-2C85-9BA8-A246-168258A9E1DF}"/>
               </a:ext>
             </a:extLst>
           </p:cNvPr>
@@ -185,18 +185,16 @@
         </p:nvSpPr>
         <p:spPr>
           <a:xfrm>
-            <a:off x="2301923" y="3843708"/>
-            <a:ext cx="7588155" cy="1414091"/>
+            <a:off x="1524000" y="3602038"/>
+            <a:ext cx="9144000" cy="1655762"/>
           </a:xfrm>
         </p:spPr>
         <p:txBody>
-          <a:bodyPr>
-            <a:normAutofit/>
-          </a:bodyPr>
+          <a:bodyPr/>
           <a:lstStyle>
             <a:lvl1pPr marL="0" indent="0" algn="ctr">
               <a:buNone/>
-              <a:defRPr sz="1800"/>
+              <a:defRPr sz="2400"/>
             </a:lvl1pPr>
             <a:lvl2pPr marL="457200" indent="0" algn="ctr">
               <a:buNone/>
@@ -236,7 +234,6 @@
               <a:rPr lang="en-US"/>
               <a:t>Click to edit Master subtitle style</a:t>
             </a:r>
-            <a:endParaRPr lang="en-US" dirty="0"/>
           </a:p>
         </p:txBody>
       </p:sp>
@@ -245,7 +242,7 @@
           <p:cNvPr id="4" name="Date Placeholder 3">
             <a:extLst>
               <a:ext uri="{FF2B5EF4-FFF2-40B4-BE49-F238E27FC236}">
-                <a16:creationId xmlns:a16="http://schemas.microsoft.com/office/drawing/2014/main" id="{EAE2DAFA-435E-AAF9-8B67-495E5AFDCD91}"/>
+                <a16:creationId xmlns:a16="http://schemas.microsoft.com/office/drawing/2014/main" id="{62054390-64AB-E999-0080-CE6D04D5D16E}"/>
               </a:ext>
             </a:extLst>
           </p:cNvPr>
@@ -263,7 +260,7 @@
           <a:p>
             <a:fld id="{C128FA71-3A18-48C0-980F-4B68F7F63042}" type="datetime1">
               <a:rPr lang="en-US" smtClean="0"/>
-              <a:t>1/15/26</a:t>
+              <a:t>1/18/26</a:t>
             </a:fld>
             <a:endParaRPr lang="en-US"/>
           </a:p>
@@ -274,7 +271,7 @@
           <p:cNvPr id="5" name="Footer Placeholder 4">
             <a:extLst>
               <a:ext uri="{FF2B5EF4-FFF2-40B4-BE49-F238E27FC236}">
-                <a16:creationId xmlns:a16="http://schemas.microsoft.com/office/drawing/2014/main" id="{5B407A58-3351-E479-1A0C-2FF49FA42707}"/>
+                <a16:creationId xmlns:a16="http://schemas.microsoft.com/office/drawing/2014/main" id="{E517A513-015C-7615-9F51-0D9375939C0D}"/>
               </a:ext>
             </a:extLst>
           </p:cNvPr>
@@ -299,7 +296,7 @@
           <p:cNvPr id="6" name="Slide Number Placeholder 5">
             <a:extLst>
               <a:ext uri="{FF2B5EF4-FFF2-40B4-BE49-F238E27FC236}">
-                <a16:creationId xmlns:a16="http://schemas.microsoft.com/office/drawing/2014/main" id="{81789E10-2433-2ECB-9C92-571B583A4CF1}"/>
+                <a16:creationId xmlns:a16="http://schemas.microsoft.com/office/drawing/2014/main" id="{0BC45EDB-6907-4099-9B28-AAF1061A1AA9}"/>
               </a:ext>
             </a:extLst>
           </p:cNvPr>
@@ -326,7 +323,7 @@
     </p:spTree>
     <p:extLst>
       <p:ext uri="{BB962C8B-B14F-4D97-AF65-F5344CB8AC3E}">
-        <p14:creationId xmlns:p14="http://schemas.microsoft.com/office/powerpoint/2010/main" val="807948930"/>
+        <p14:creationId xmlns:p14="http://schemas.microsoft.com/office/powerpoint/2010/main" val="1336165040"/>
       </p:ext>
     </p:extLst>
   </p:cSld>
@@ -358,7 +355,7 @@
           <p:cNvPr id="2" name="Title 1">
             <a:extLst>
               <a:ext uri="{FF2B5EF4-FFF2-40B4-BE49-F238E27FC236}">
-                <a16:creationId xmlns:a16="http://schemas.microsoft.com/office/drawing/2014/main" id="{354E956D-CB73-C986-F100-46487310D11E}"/>
+                <a16:creationId xmlns:a16="http://schemas.microsoft.com/office/drawing/2014/main" id="{1F679153-FF0F-05FC-9E49-472E53963461}"/>
               </a:ext>
             </a:extLst>
           </p:cNvPr>
@@ -369,12 +366,7 @@
             <p:ph type="title"/>
           </p:nvPr>
         </p:nvSpPr>
-        <p:spPr>
-          <a:xfrm>
-            <a:off x="612648" y="548640"/>
-            <a:ext cx="10515600" cy="1132258"/>
-          </a:xfrm>
-        </p:spPr>
+        <p:spPr/>
         <p:txBody>
           <a:bodyPr/>
           <a:lstStyle/>
@@ -391,7 +383,7 @@
           <p:cNvPr id="3" name="Vertical Text Placeholder 2">
             <a:extLst>
               <a:ext uri="{FF2B5EF4-FFF2-40B4-BE49-F238E27FC236}">
-                <a16:creationId xmlns:a16="http://schemas.microsoft.com/office/drawing/2014/main" id="{FE423E6A-A07C-BF0D-EA30-9A8A854E48F1}"/>
+                <a16:creationId xmlns:a16="http://schemas.microsoft.com/office/drawing/2014/main" id="{D3428D08-AB36-2473-3CD9-6CF222772E53}"/>
               </a:ext>
             </a:extLst>
           </p:cNvPr>
@@ -402,12 +394,7 @@
             <p:ph type="body" orient="vert" idx="1"/>
           </p:nvPr>
         </p:nvSpPr>
-        <p:spPr>
-          <a:xfrm>
-            <a:off x="612648" y="1680898"/>
-            <a:ext cx="10515600" cy="4496065"/>
-          </a:xfrm>
-        </p:spPr>
+        <p:spPr/>
         <p:txBody>
           <a:bodyPr vert="eaVert"/>
           <a:lstStyle/>
@@ -453,7 +440,7 @@
           <p:cNvPr id="4" name="Date Placeholder 3">
             <a:extLst>
               <a:ext uri="{FF2B5EF4-FFF2-40B4-BE49-F238E27FC236}">
-                <a16:creationId xmlns:a16="http://schemas.microsoft.com/office/drawing/2014/main" id="{EEDC9908-8F95-8DFC-72CC-158552B56735}"/>
+                <a16:creationId xmlns:a16="http://schemas.microsoft.com/office/drawing/2014/main" id="{A32CC1D8-F5D0-4FDB-42B4-81D8669085EE}"/>
               </a:ext>
             </a:extLst>
           </p:cNvPr>
@@ -471,7 +458,7 @@
           <a:p>
             <a:fld id="{7104EDB3-C0E8-45F8-9E1D-1B6C8D1880C0}" type="datetime1">
               <a:rPr lang="en-US" smtClean="0"/>
-              <a:t>1/15/26</a:t>
+              <a:t>1/18/26</a:t>
             </a:fld>
             <a:endParaRPr lang="en-US"/>
           </a:p>
@@ -482,7 +469,7 @@
           <p:cNvPr id="5" name="Footer Placeholder 4">
             <a:extLst>
               <a:ext uri="{FF2B5EF4-FFF2-40B4-BE49-F238E27FC236}">
-                <a16:creationId xmlns:a16="http://schemas.microsoft.com/office/drawing/2014/main" id="{2C26C9BE-9060-50CB-2BB7-07307FF89A7A}"/>
+                <a16:creationId xmlns:a16="http://schemas.microsoft.com/office/drawing/2014/main" id="{65F42517-C6F1-1ED9-5EC6-078D07EE1F56}"/>
               </a:ext>
             </a:extLst>
           </p:cNvPr>
@@ -507,7 +494,7 @@
           <p:cNvPr id="6" name="Slide Number Placeholder 5">
             <a:extLst>
               <a:ext uri="{FF2B5EF4-FFF2-40B4-BE49-F238E27FC236}">
-                <a16:creationId xmlns:a16="http://schemas.microsoft.com/office/drawing/2014/main" id="{A84A835B-97D3-BC22-F0B8-4986D4636271}"/>
+                <a16:creationId xmlns:a16="http://schemas.microsoft.com/office/drawing/2014/main" id="{97E2B2E6-9102-C6EA-5508-7DB678C8D43E}"/>
               </a:ext>
             </a:extLst>
           </p:cNvPr>
@@ -534,7 +521,7 @@
     </p:spTree>
     <p:extLst>
       <p:ext uri="{BB962C8B-B14F-4D97-AF65-F5344CB8AC3E}">
-        <p14:creationId xmlns:p14="http://schemas.microsoft.com/office/powerpoint/2010/main" val="1822711737"/>
+        <p14:creationId xmlns:p14="http://schemas.microsoft.com/office/powerpoint/2010/main" val="2153808576"/>
       </p:ext>
     </p:extLst>
   </p:cSld>
@@ -566,7 +553,7 @@
           <p:cNvPr id="2" name="Vertical Title 1">
             <a:extLst>
               <a:ext uri="{FF2B5EF4-FFF2-40B4-BE49-F238E27FC236}">
-                <a16:creationId xmlns:a16="http://schemas.microsoft.com/office/drawing/2014/main" id="{485B0252-346C-F6F4-3642-19F571550D45}"/>
+                <a16:creationId xmlns:a16="http://schemas.microsoft.com/office/drawing/2014/main" id="{BB6211AB-9717-3A26-5ABA-D2A602FF0AA3}"/>
               </a:ext>
             </a:extLst>
           </p:cNvPr>
@@ -579,8 +566,8 @@
         </p:nvSpPr>
         <p:spPr>
           <a:xfrm>
-            <a:off x="9634888" y="578497"/>
-            <a:ext cx="2047037" cy="5598466"/>
+            <a:off x="8724900" y="365125"/>
+            <a:ext cx="2628900" cy="5811838"/>
           </a:xfrm>
         </p:spPr>
         <p:txBody>
@@ -591,7 +578,6 @@
               <a:rPr lang="en-US"/>
               <a:t>Click to edit Master title style</a:t>
             </a:r>
-            <a:endParaRPr lang="en-US" dirty="0"/>
           </a:p>
         </p:txBody>
       </p:sp>
@@ -600,7 +586,7 @@
           <p:cNvPr id="3" name="Vertical Text Placeholder 2">
             <a:extLst>
               <a:ext uri="{FF2B5EF4-FFF2-40B4-BE49-F238E27FC236}">
-                <a16:creationId xmlns:a16="http://schemas.microsoft.com/office/drawing/2014/main" id="{F798DA36-7351-9D6A-518B-678AB8A507D3}"/>
+                <a16:creationId xmlns:a16="http://schemas.microsoft.com/office/drawing/2014/main" id="{BAB4B604-0A0B-3BD4-1E62-9C053A17CF9E}"/>
               </a:ext>
             </a:extLst>
           </p:cNvPr>
@@ -613,8 +599,8 @@
         </p:nvSpPr>
         <p:spPr>
           <a:xfrm>
-            <a:off x="838200" y="578497"/>
-            <a:ext cx="8796688" cy="5598465"/>
+            <a:off x="838200" y="365125"/>
+            <a:ext cx="7734300" cy="5811838"/>
           </a:xfrm>
         </p:spPr>
         <p:txBody>
@@ -654,7 +640,6 @@
               <a:rPr lang="en-US"/>
               <a:t>Fifth level</a:t>
             </a:r>
-            <a:endParaRPr lang="en-US" dirty="0"/>
           </a:p>
         </p:txBody>
       </p:sp>
@@ -663,7 +648,7 @@
           <p:cNvPr id="4" name="Date Placeholder 3">
             <a:extLst>
               <a:ext uri="{FF2B5EF4-FFF2-40B4-BE49-F238E27FC236}">
-                <a16:creationId xmlns:a16="http://schemas.microsoft.com/office/drawing/2014/main" id="{8846BDFF-D746-836C-04B8-CA89AD5D1466}"/>
+                <a16:creationId xmlns:a16="http://schemas.microsoft.com/office/drawing/2014/main" id="{60F53DB4-5088-7468-3B05-B793BFB38809}"/>
               </a:ext>
             </a:extLst>
           </p:cNvPr>
@@ -681,7 +666,7 @@
           <a:p>
             <a:fld id="{9CF0EC4B-54ED-4041-B552-9BA760FA3DBA}" type="datetime1">
               <a:rPr lang="en-US" smtClean="0"/>
-              <a:t>1/15/26</a:t>
+              <a:t>1/18/26</a:t>
             </a:fld>
             <a:endParaRPr lang="en-US"/>
           </a:p>
@@ -692,7 +677,7 @@
           <p:cNvPr id="5" name="Footer Placeholder 4">
             <a:extLst>
               <a:ext uri="{FF2B5EF4-FFF2-40B4-BE49-F238E27FC236}">
-                <a16:creationId xmlns:a16="http://schemas.microsoft.com/office/drawing/2014/main" id="{919AA929-A9E6-FF9C-0C59-177F892D6A69}"/>
+                <a16:creationId xmlns:a16="http://schemas.microsoft.com/office/drawing/2014/main" id="{F260E0C7-68F4-2D05-6CB0-9E5FBEA4E1F3}"/>
               </a:ext>
             </a:extLst>
           </p:cNvPr>
@@ -717,7 +702,7 @@
           <p:cNvPr id="6" name="Slide Number Placeholder 5">
             <a:extLst>
               <a:ext uri="{FF2B5EF4-FFF2-40B4-BE49-F238E27FC236}">
-                <a16:creationId xmlns:a16="http://schemas.microsoft.com/office/drawing/2014/main" id="{9316D893-7E81-90DC-4139-7687B39C3AC8}"/>
+                <a16:creationId xmlns:a16="http://schemas.microsoft.com/office/drawing/2014/main" id="{8F215230-7243-E83E-8D51-DF1CFF7548E9}"/>
               </a:ext>
             </a:extLst>
           </p:cNvPr>
@@ -744,7 +729,7 @@
     </p:spTree>
     <p:extLst>
       <p:ext uri="{BB962C8B-B14F-4D97-AF65-F5344CB8AC3E}">
-        <p14:creationId xmlns:p14="http://schemas.microsoft.com/office/powerpoint/2010/main" val="1579758320"/>
+        <p14:creationId xmlns:p14="http://schemas.microsoft.com/office/powerpoint/2010/main" val="698346027"/>
       </p:ext>
     </p:extLst>
   </p:cSld>
@@ -776,7 +761,7 @@
           <p:cNvPr id="2" name="Title 1">
             <a:extLst>
               <a:ext uri="{FF2B5EF4-FFF2-40B4-BE49-F238E27FC236}">
-                <a16:creationId xmlns:a16="http://schemas.microsoft.com/office/drawing/2014/main" id="{BC7433D9-FD02-59E2-0F81-A0B7201D2DA0}"/>
+                <a16:creationId xmlns:a16="http://schemas.microsoft.com/office/drawing/2014/main" id="{454729E9-D75F-3103-F66A-9A15DE77F3C5}"/>
               </a:ext>
             </a:extLst>
           </p:cNvPr>
@@ -804,7 +789,7 @@
           <p:cNvPr id="3" name="Content Placeholder 2">
             <a:extLst>
               <a:ext uri="{FF2B5EF4-FFF2-40B4-BE49-F238E27FC236}">
-                <a16:creationId xmlns:a16="http://schemas.microsoft.com/office/drawing/2014/main" id="{6C2DD052-3E45-E789-01F8-33250024ECBD}"/>
+                <a16:creationId xmlns:a16="http://schemas.microsoft.com/office/drawing/2014/main" id="{1725E4F5-F66D-8845-4FD2-CFE15F8764F0}"/>
               </a:ext>
             </a:extLst>
           </p:cNvPr>
@@ -861,7 +846,7 @@
           <p:cNvPr id="4" name="Date Placeholder 3">
             <a:extLst>
               <a:ext uri="{FF2B5EF4-FFF2-40B4-BE49-F238E27FC236}">
-                <a16:creationId xmlns:a16="http://schemas.microsoft.com/office/drawing/2014/main" id="{0B9485D1-E172-8F0A-A425-3097B3ABCFB4}"/>
+                <a16:creationId xmlns:a16="http://schemas.microsoft.com/office/drawing/2014/main" id="{91156C42-4E2F-3995-6891-82FA6B0F01A7}"/>
               </a:ext>
             </a:extLst>
           </p:cNvPr>
@@ -879,7 +864,7 @@
           <a:p>
             <a:fld id="{51C1210E-201E-4473-82AC-2466F5386C38}" type="datetime1">
               <a:rPr lang="en-US" smtClean="0"/>
-              <a:t>1/15/26</a:t>
+              <a:t>1/18/26</a:t>
             </a:fld>
             <a:endParaRPr lang="en-US"/>
           </a:p>
@@ -890,7 +875,7 @@
           <p:cNvPr id="5" name="Footer Placeholder 4">
             <a:extLst>
               <a:ext uri="{FF2B5EF4-FFF2-40B4-BE49-F238E27FC236}">
-                <a16:creationId xmlns:a16="http://schemas.microsoft.com/office/drawing/2014/main" id="{B17E6B5E-6174-FD5C-41E8-FFC44C650D7E}"/>
+                <a16:creationId xmlns:a16="http://schemas.microsoft.com/office/drawing/2014/main" id="{E3DF9815-9298-DE85-E1F3-01A2717A6CE4}"/>
               </a:ext>
             </a:extLst>
           </p:cNvPr>
@@ -915,7 +900,7 @@
           <p:cNvPr id="6" name="Slide Number Placeholder 5">
             <a:extLst>
               <a:ext uri="{FF2B5EF4-FFF2-40B4-BE49-F238E27FC236}">
-                <a16:creationId xmlns:a16="http://schemas.microsoft.com/office/drawing/2014/main" id="{4BF72154-F85B-E301-DA57-E314D7315916}"/>
+                <a16:creationId xmlns:a16="http://schemas.microsoft.com/office/drawing/2014/main" id="{4AAE2E26-5F64-D0EC-DE24-90AD75B7D19D}"/>
               </a:ext>
             </a:extLst>
           </p:cNvPr>
@@ -942,7 +927,7 @@
     </p:spTree>
     <p:extLst>
       <p:ext uri="{BB962C8B-B14F-4D97-AF65-F5344CB8AC3E}">
-        <p14:creationId xmlns:p14="http://schemas.microsoft.com/office/powerpoint/2010/main" val="20844163"/>
+        <p14:creationId xmlns:p14="http://schemas.microsoft.com/office/powerpoint/2010/main" val="1238128950"/>
       </p:ext>
     </p:extLst>
   </p:cSld>
@@ -974,7 +959,7 @@
           <p:cNvPr id="2" name="Title 1">
             <a:extLst>
               <a:ext uri="{FF2B5EF4-FFF2-40B4-BE49-F238E27FC236}">
-                <a16:creationId xmlns:a16="http://schemas.microsoft.com/office/drawing/2014/main" id="{951D06AF-EF87-8489-2C82-DEB90B7EFE0C}"/>
+                <a16:creationId xmlns:a16="http://schemas.microsoft.com/office/drawing/2014/main" id="{4C05E30D-605E-9214-D178-6C3CB8D4B8C9}"/>
               </a:ext>
             </a:extLst>
           </p:cNvPr>
@@ -987,17 +972,15 @@
         </p:nvSpPr>
         <p:spPr>
           <a:xfrm>
-            <a:off x="603381" y="553616"/>
-            <a:ext cx="8273140" cy="4008859"/>
+            <a:off x="831850" y="1709738"/>
+            <a:ext cx="10515600" cy="2852737"/>
           </a:xfrm>
         </p:spPr>
         <p:txBody>
-          <a:bodyPr anchor="t">
-            <a:normAutofit/>
-          </a:bodyPr>
+          <a:bodyPr anchor="b"/>
           <a:lstStyle>
             <a:lvl1pPr>
-              <a:defRPr sz="5400" cap="all" baseline="0"/>
+              <a:defRPr sz="6000"/>
             </a:lvl1pPr>
           </a:lstStyle>
           <a:p>
@@ -1005,7 +988,6 @@
               <a:rPr lang="en-US"/>
               <a:t>Click to edit Master title style</a:t>
             </a:r>
-            <a:endParaRPr lang="en-US" dirty="0"/>
           </a:p>
         </p:txBody>
       </p:sp>
@@ -1014,7 +996,7 @@
           <p:cNvPr id="3" name="Text Placeholder 2">
             <a:extLst>
               <a:ext uri="{FF2B5EF4-FFF2-40B4-BE49-F238E27FC236}">
-                <a16:creationId xmlns:a16="http://schemas.microsoft.com/office/drawing/2014/main" id="{308E5678-CA38-1318-9EA2-5E0A4F9A59BA}"/>
+                <a16:creationId xmlns:a16="http://schemas.microsoft.com/office/drawing/2014/main" id="{DCF4910E-4CE5-0FC1-F778-1F683F55538C}"/>
               </a:ext>
             </a:extLst>
           </p:cNvPr>
@@ -1027,20 +1009,20 @@
         </p:nvSpPr>
         <p:spPr>
           <a:xfrm>
-            <a:off x="603380" y="4589463"/>
-            <a:ext cx="8273140" cy="1384617"/>
+            <a:off x="831850" y="4589463"/>
+            <a:ext cx="10515600" cy="1500187"/>
           </a:xfrm>
         </p:spPr>
         <p:txBody>
-          <a:bodyPr anchor="b">
-            <a:normAutofit/>
-          </a:bodyPr>
+          <a:bodyPr/>
           <a:lstStyle>
             <a:lvl1pPr marL="0" indent="0">
               <a:buNone/>
-              <a:defRPr sz="2000">
+              <a:defRPr sz="2400">
                 <a:solidFill>
-                  <a:schemeClr val="tx1"/>
+                  <a:schemeClr val="tx1">
+                    <a:tint val="82000"/>
+                  </a:schemeClr>
                 </a:solidFill>
               </a:defRPr>
             </a:lvl1pPr>
@@ -1049,7 +1031,7 @@
               <a:defRPr sz="2000">
                 <a:solidFill>
                   <a:schemeClr val="tx1">
-                    <a:tint val="75000"/>
+                    <a:tint val="82000"/>
                   </a:schemeClr>
                 </a:solidFill>
               </a:defRPr>
@@ -1059,7 +1041,7 @@
               <a:defRPr sz="1800">
                 <a:solidFill>
                   <a:schemeClr val="tx1">
-                    <a:tint val="75000"/>
+                    <a:tint val="82000"/>
                   </a:schemeClr>
                 </a:solidFill>
               </a:defRPr>
@@ -1069,7 +1051,7 @@
               <a:defRPr sz="1600">
                 <a:solidFill>
                   <a:schemeClr val="tx1">
-                    <a:tint val="75000"/>
+                    <a:tint val="82000"/>
                   </a:schemeClr>
                 </a:solidFill>
               </a:defRPr>
@@ -1079,7 +1061,7 @@
               <a:defRPr sz="1600">
                 <a:solidFill>
                   <a:schemeClr val="tx1">
-                    <a:tint val="75000"/>
+                    <a:tint val="82000"/>
                   </a:schemeClr>
                 </a:solidFill>
               </a:defRPr>
@@ -1089,7 +1071,7 @@
               <a:defRPr sz="1600">
                 <a:solidFill>
                   <a:schemeClr val="tx1">
-                    <a:tint val="75000"/>
+                    <a:tint val="82000"/>
                   </a:schemeClr>
                 </a:solidFill>
               </a:defRPr>
@@ -1099,7 +1081,7 @@
               <a:defRPr sz="1600">
                 <a:solidFill>
                   <a:schemeClr val="tx1">
-                    <a:tint val="75000"/>
+                    <a:tint val="82000"/>
                   </a:schemeClr>
                 </a:solidFill>
               </a:defRPr>
@@ -1109,7 +1091,7 @@
               <a:defRPr sz="1600">
                 <a:solidFill>
                   <a:schemeClr val="tx1">
-                    <a:tint val="75000"/>
+                    <a:tint val="82000"/>
                   </a:schemeClr>
                 </a:solidFill>
               </a:defRPr>
@@ -1119,7 +1101,7 @@
               <a:defRPr sz="1600">
                 <a:solidFill>
                   <a:schemeClr val="tx1">
-                    <a:tint val="75000"/>
+                    <a:tint val="82000"/>
                   </a:schemeClr>
                 </a:solidFill>
               </a:defRPr>
@@ -1139,7 +1121,7 @@
           <p:cNvPr id="4" name="Date Placeholder 3">
             <a:extLst>
               <a:ext uri="{FF2B5EF4-FFF2-40B4-BE49-F238E27FC236}">
-                <a16:creationId xmlns:a16="http://schemas.microsoft.com/office/drawing/2014/main" id="{44E99186-7E5A-60AF-DE69-5C7DA71611AB}"/>
+                <a16:creationId xmlns:a16="http://schemas.microsoft.com/office/drawing/2014/main" id="{72E29711-B1BE-9836-3020-1A3A4F5019F5}"/>
               </a:ext>
             </a:extLst>
           </p:cNvPr>
@@ -1157,7 +1139,7 @@
           <a:p>
             <a:fld id="{B01EA198-6CAB-4B8F-B93F-1F9C8C4B6CE7}" type="datetime1">
               <a:rPr lang="en-US" smtClean="0"/>
-              <a:t>1/15/26</a:t>
+              <a:t>1/18/26</a:t>
             </a:fld>
             <a:endParaRPr lang="en-US"/>
           </a:p>
@@ -1168,7 +1150,7 @@
           <p:cNvPr id="5" name="Footer Placeholder 4">
             <a:extLst>
               <a:ext uri="{FF2B5EF4-FFF2-40B4-BE49-F238E27FC236}">
-                <a16:creationId xmlns:a16="http://schemas.microsoft.com/office/drawing/2014/main" id="{82FA13D1-1FBA-E820-323B-77B41F1A665D}"/>
+                <a16:creationId xmlns:a16="http://schemas.microsoft.com/office/drawing/2014/main" id="{72434A8D-CE4E-772F-B618-4390648B1DD6}"/>
               </a:ext>
             </a:extLst>
           </p:cNvPr>
@@ -1193,7 +1175,7 @@
           <p:cNvPr id="6" name="Slide Number Placeholder 5">
             <a:extLst>
               <a:ext uri="{FF2B5EF4-FFF2-40B4-BE49-F238E27FC236}">
-                <a16:creationId xmlns:a16="http://schemas.microsoft.com/office/drawing/2014/main" id="{FB39BE85-85F6-4636-C651-D87CC969A49E}"/>
+                <a16:creationId xmlns:a16="http://schemas.microsoft.com/office/drawing/2014/main" id="{FF142F58-706C-950E-1FBA-66829EC333DC}"/>
               </a:ext>
             </a:extLst>
           </p:cNvPr>
@@ -1220,7 +1202,7 @@
     </p:spTree>
     <p:extLst>
       <p:ext uri="{BB962C8B-B14F-4D97-AF65-F5344CB8AC3E}">
-        <p14:creationId xmlns:p14="http://schemas.microsoft.com/office/powerpoint/2010/main" val="2641977585"/>
+        <p14:creationId xmlns:p14="http://schemas.microsoft.com/office/powerpoint/2010/main" val="990530033"/>
       </p:ext>
     </p:extLst>
   </p:cSld>
@@ -1252,7 +1234,7 @@
           <p:cNvPr id="2" name="Title 1">
             <a:extLst>
               <a:ext uri="{FF2B5EF4-FFF2-40B4-BE49-F238E27FC236}">
-                <a16:creationId xmlns:a16="http://schemas.microsoft.com/office/drawing/2014/main" id="{FAF3BB49-A328-F121-7F27-DEB7C3CC2B0F}"/>
+                <a16:creationId xmlns:a16="http://schemas.microsoft.com/office/drawing/2014/main" id="{20F4583E-F174-5DB0-7B6F-25DB275A9A8A}"/>
               </a:ext>
             </a:extLst>
           </p:cNvPr>
@@ -1261,45 +1243,39 @@
           </p:cNvSpPr>
           <p:nvPr>
             <p:ph type="title"/>
+          </p:nvPr>
+        </p:nvSpPr>
+        <p:spPr/>
+        <p:txBody>
+          <a:bodyPr/>
+          <a:lstStyle/>
+          <a:p>
+            <a:r>
+              <a:rPr lang="en-US"/>
+              <a:t>Click to edit Master title style</a:t>
+            </a:r>
+          </a:p>
+        </p:txBody>
+      </p:sp>
+      <p:sp>
+        <p:nvSpPr>
+          <p:cNvPr id="3" name="Content Placeholder 2">
+            <a:extLst>
+              <a:ext uri="{FF2B5EF4-FFF2-40B4-BE49-F238E27FC236}">
+                <a16:creationId xmlns:a16="http://schemas.microsoft.com/office/drawing/2014/main" id="{BC6B0D45-CD3D-3BBB-7FD2-528C2FFD696B}"/>
+              </a:ext>
+            </a:extLst>
+          </p:cNvPr>
+          <p:cNvSpPr>
+            <a:spLocks noGrp="1"/>
+          </p:cNvSpPr>
+          <p:nvPr>
+            <p:ph sz="half" idx="1"/>
           </p:nvPr>
         </p:nvSpPr>
         <p:spPr>
           <a:xfrm>
-            <a:off x="612648" y="548640"/>
-            <a:ext cx="10741152" cy="1132258"/>
-          </a:xfrm>
-        </p:spPr>
-        <p:txBody>
-          <a:bodyPr/>
-          <a:lstStyle/>
-          <a:p>
-            <a:r>
-              <a:rPr lang="en-US"/>
-              <a:t>Click to edit Master title style</a:t>
-            </a:r>
-            <a:endParaRPr lang="en-US" dirty="0"/>
-          </a:p>
-        </p:txBody>
-      </p:sp>
-      <p:sp>
-        <p:nvSpPr>
-          <p:cNvPr id="3" name="Content Placeholder 2">
-            <a:extLst>
-              <a:ext uri="{FF2B5EF4-FFF2-40B4-BE49-F238E27FC236}">
-                <a16:creationId xmlns:a16="http://schemas.microsoft.com/office/drawing/2014/main" id="{572E861E-DFBA-B4AA-9356-CDE3D3F57C04}"/>
-              </a:ext>
-            </a:extLst>
-          </p:cNvPr>
-          <p:cNvSpPr>
-            <a:spLocks noGrp="1"/>
-          </p:cNvSpPr>
-          <p:nvPr>
-            <p:ph sz="half" idx="1"/>
-          </p:nvPr>
-        </p:nvSpPr>
-        <p:spPr>
-          <a:xfrm>
-            <a:off x="612648" y="1825625"/>
+            <a:off x="838200" y="1825625"/>
             <a:ext cx="5181600" cy="4351338"/>
           </a:xfrm>
         </p:spPr>
@@ -1340,7 +1316,6 @@
               <a:rPr lang="en-US"/>
               <a:t>Fifth level</a:t>
             </a:r>
-            <a:endParaRPr lang="en-US" dirty="0"/>
           </a:p>
         </p:txBody>
       </p:sp>
@@ -1349,7 +1324,7 @@
           <p:cNvPr id="4" name="Content Placeholder 3">
             <a:extLst>
               <a:ext uri="{FF2B5EF4-FFF2-40B4-BE49-F238E27FC236}">
-                <a16:creationId xmlns:a16="http://schemas.microsoft.com/office/drawing/2014/main" id="{451D7538-EC5A-3EE7-176F-A58920C50797}"/>
+                <a16:creationId xmlns:a16="http://schemas.microsoft.com/office/drawing/2014/main" id="{4ECA511D-FB92-E1A6-1E8B-70CD584F95DC}"/>
               </a:ext>
             </a:extLst>
           </p:cNvPr>
@@ -1411,7 +1386,7 @@
           <p:cNvPr id="5" name="Date Placeholder 4">
             <a:extLst>
               <a:ext uri="{FF2B5EF4-FFF2-40B4-BE49-F238E27FC236}">
-                <a16:creationId xmlns:a16="http://schemas.microsoft.com/office/drawing/2014/main" id="{897D0B7E-1A60-DA52-6965-92412B1C2F9F}"/>
+                <a16:creationId xmlns:a16="http://schemas.microsoft.com/office/drawing/2014/main" id="{BCF401D7-AAE4-4405-8FFE-2506B97A659E}"/>
               </a:ext>
             </a:extLst>
           </p:cNvPr>
@@ -1429,7 +1404,7 @@
           <a:p>
             <a:fld id="{CA06041F-4525-44D5-AA4F-332294BF1F56}" type="datetime1">
               <a:rPr lang="en-US" smtClean="0"/>
-              <a:t>1/15/26</a:t>
+              <a:t>1/18/26</a:t>
             </a:fld>
             <a:endParaRPr lang="en-US"/>
           </a:p>
@@ -1440,7 +1415,7 @@
           <p:cNvPr id="6" name="Footer Placeholder 5">
             <a:extLst>
               <a:ext uri="{FF2B5EF4-FFF2-40B4-BE49-F238E27FC236}">
-                <a16:creationId xmlns:a16="http://schemas.microsoft.com/office/drawing/2014/main" id="{C2BDD5A2-CE3E-3215-6DAA-F75C0D1229DA}"/>
+                <a16:creationId xmlns:a16="http://schemas.microsoft.com/office/drawing/2014/main" id="{52794708-2AA9-C924-DBA9-141931A619A0}"/>
               </a:ext>
             </a:extLst>
           </p:cNvPr>
@@ -1465,7 +1440,7 @@
           <p:cNvPr id="7" name="Slide Number Placeholder 6">
             <a:extLst>
               <a:ext uri="{FF2B5EF4-FFF2-40B4-BE49-F238E27FC236}">
-                <a16:creationId xmlns:a16="http://schemas.microsoft.com/office/drawing/2014/main" id="{B1B822F1-284A-1786-FAF2-72129E2FE64D}"/>
+                <a16:creationId xmlns:a16="http://schemas.microsoft.com/office/drawing/2014/main" id="{F92C6BF4-F60D-2D92-F7FA-5E23BD58D4C9}"/>
               </a:ext>
             </a:extLst>
           </p:cNvPr>
@@ -1492,7 +1467,7 @@
     </p:spTree>
     <p:extLst>
       <p:ext uri="{BB962C8B-B14F-4D97-AF65-F5344CB8AC3E}">
-        <p14:creationId xmlns:p14="http://schemas.microsoft.com/office/powerpoint/2010/main" val="1763307581"/>
+        <p14:creationId xmlns:p14="http://schemas.microsoft.com/office/powerpoint/2010/main" val="2323128385"/>
       </p:ext>
     </p:extLst>
   </p:cSld>
@@ -1524,7 +1499,7 @@
           <p:cNvPr id="2" name="Title 1">
             <a:extLst>
               <a:ext uri="{FF2B5EF4-FFF2-40B4-BE49-F238E27FC236}">
-                <a16:creationId xmlns:a16="http://schemas.microsoft.com/office/drawing/2014/main" id="{41FEE969-634D-6E32-D227-18E9282C6F9E}"/>
+                <a16:creationId xmlns:a16="http://schemas.microsoft.com/office/drawing/2014/main" id="{F0D96CC9-CFA1-4FAC-8369-966027D6492A}"/>
               </a:ext>
             </a:extLst>
           </p:cNvPr>
@@ -1537,8 +1512,8 @@
         </p:nvSpPr>
         <p:spPr>
           <a:xfrm>
-            <a:off x="609600" y="547396"/>
-            <a:ext cx="10745788" cy="1143292"/>
+            <a:off x="839788" y="365125"/>
+            <a:ext cx="10515600" cy="1325563"/>
           </a:xfrm>
         </p:spPr>
         <p:txBody>
@@ -1549,7 +1524,6 @@
               <a:rPr lang="en-US"/>
               <a:t>Click to edit Master title style</a:t>
             </a:r>
-            <a:endParaRPr lang="en-US" dirty="0"/>
           </a:p>
         </p:txBody>
       </p:sp>
@@ -1558,7 +1532,7 @@
           <p:cNvPr id="3" name="Text Placeholder 2">
             <a:extLst>
               <a:ext uri="{FF2B5EF4-FFF2-40B4-BE49-F238E27FC236}">
-                <a16:creationId xmlns:a16="http://schemas.microsoft.com/office/drawing/2014/main" id="{61CD26D4-290A-F0ED-7D62-41EDA6FEC2B9}"/>
+                <a16:creationId xmlns:a16="http://schemas.microsoft.com/office/drawing/2014/main" id="{6C279BD6-E835-43BC-E9E3-6E2A8F2051BF}"/>
               </a:ext>
             </a:extLst>
           </p:cNvPr>
@@ -1571,21 +1545,16 @@
         </p:nvSpPr>
         <p:spPr>
           <a:xfrm>
-            <a:off x="609600" y="1685735"/>
-            <a:ext cx="5157787" cy="559834"/>
+            <a:off x="839788" y="1681163"/>
+            <a:ext cx="5157787" cy="823912"/>
           </a:xfrm>
         </p:spPr>
         <p:txBody>
-          <a:bodyPr anchor="b">
-            <a:normAutofit/>
-          </a:bodyPr>
+          <a:bodyPr anchor="b"/>
           <a:lstStyle>
             <a:lvl1pPr marL="0" indent="0">
-              <a:lnSpc>
-                <a:spcPct val="90000"/>
-              </a:lnSpc>
-              <a:buNone/>
-              <a:defRPr sz="2000" b="1" cap="all" baseline="0"/>
+              <a:buNone/>
+              <a:defRPr sz="2400" b="1"/>
             </a:lvl1pPr>
             <a:lvl2pPr marL="457200" indent="0">
               <a:buNone/>
@@ -1634,7 +1603,7 @@
           <p:cNvPr id="4" name="Content Placeholder 3">
             <a:extLst>
               <a:ext uri="{FF2B5EF4-FFF2-40B4-BE49-F238E27FC236}">
-                <a16:creationId xmlns:a16="http://schemas.microsoft.com/office/drawing/2014/main" id="{94DA52B0-7419-A946-4523-6D34BCAD26D1}"/>
+                <a16:creationId xmlns:a16="http://schemas.microsoft.com/office/drawing/2014/main" id="{84ACBDBA-AA2D-24CC-F32E-18F15E22DD4E}"/>
               </a:ext>
             </a:extLst>
           </p:cNvPr>
@@ -1647,8 +1616,8 @@
         </p:nvSpPr>
         <p:spPr>
           <a:xfrm>
-            <a:off x="609600" y="2386894"/>
-            <a:ext cx="5157787" cy="3765089"/>
+            <a:off x="839788" y="2505075"/>
+            <a:ext cx="5157787" cy="3684588"/>
           </a:xfrm>
         </p:spPr>
         <p:txBody>
@@ -1688,7 +1657,6 @@
               <a:rPr lang="en-US"/>
               <a:t>Fifth level</a:t>
             </a:r>
-            <a:endParaRPr lang="en-US" dirty="0"/>
           </a:p>
         </p:txBody>
       </p:sp>
@@ -1697,7 +1665,7 @@
           <p:cNvPr id="5" name="Text Placeholder 4">
             <a:extLst>
               <a:ext uri="{FF2B5EF4-FFF2-40B4-BE49-F238E27FC236}">
-                <a16:creationId xmlns:a16="http://schemas.microsoft.com/office/drawing/2014/main" id="{06536620-C4F3-EEC3-DBF1-05196B1CBB55}"/>
+                <a16:creationId xmlns:a16="http://schemas.microsoft.com/office/drawing/2014/main" id="{608858E4-6329-934C-18EC-27054BE6ACAC}"/>
               </a:ext>
             </a:extLst>
           </p:cNvPr>
@@ -1710,21 +1678,16 @@
         </p:nvSpPr>
         <p:spPr>
           <a:xfrm>
-            <a:off x="6172200" y="1685735"/>
-            <a:ext cx="5183188" cy="559834"/>
+            <a:off x="6172200" y="1681163"/>
+            <a:ext cx="5183188" cy="823912"/>
           </a:xfrm>
         </p:spPr>
         <p:txBody>
-          <a:bodyPr anchor="b">
-            <a:normAutofit/>
-          </a:bodyPr>
+          <a:bodyPr anchor="b"/>
           <a:lstStyle>
             <a:lvl1pPr marL="0" indent="0">
-              <a:lnSpc>
-                <a:spcPct val="90000"/>
-              </a:lnSpc>
-              <a:buNone/>
-              <a:defRPr sz="2000" b="1" cap="all" baseline="0"/>
+              <a:buNone/>
+              <a:defRPr sz="2400" b="1"/>
             </a:lvl1pPr>
             <a:lvl2pPr marL="457200" indent="0">
               <a:buNone/>
@@ -1773,7 +1736,7 @@
           <p:cNvPr id="6" name="Content Placeholder 5">
             <a:extLst>
               <a:ext uri="{FF2B5EF4-FFF2-40B4-BE49-F238E27FC236}">
-                <a16:creationId xmlns:a16="http://schemas.microsoft.com/office/drawing/2014/main" id="{33BAE980-E611-98B5-04E9-DE4584B0E33F}"/>
+                <a16:creationId xmlns:a16="http://schemas.microsoft.com/office/drawing/2014/main" id="{4132A370-0DF6-039A-1E16-1F86B4210D51}"/>
               </a:ext>
             </a:extLst>
           </p:cNvPr>
@@ -1786,8 +1749,8 @@
         </p:nvSpPr>
         <p:spPr>
           <a:xfrm>
-            <a:off x="6172199" y="2386894"/>
-            <a:ext cx="5183189" cy="3765089"/>
+            <a:off x="6172200" y="2505075"/>
+            <a:ext cx="5183188" cy="3684588"/>
           </a:xfrm>
         </p:spPr>
         <p:txBody>
@@ -1835,7 +1798,7 @@
           <p:cNvPr id="7" name="Date Placeholder 6">
             <a:extLst>
               <a:ext uri="{FF2B5EF4-FFF2-40B4-BE49-F238E27FC236}">
-                <a16:creationId xmlns:a16="http://schemas.microsoft.com/office/drawing/2014/main" id="{4E3B3581-658A-8487-F9CB-E79F2BFF27E4}"/>
+                <a16:creationId xmlns:a16="http://schemas.microsoft.com/office/drawing/2014/main" id="{A3FCA003-E8C9-B423-1458-63B828502F29}"/>
               </a:ext>
             </a:extLst>
           </p:cNvPr>
@@ -1853,7 +1816,7 @@
           <a:p>
             <a:fld id="{F9557091-BBDF-4EB9-BA6B-2BB67AC4FC0F}" type="datetime1">
               <a:rPr lang="en-US" smtClean="0"/>
-              <a:t>1/15/26</a:t>
+              <a:t>1/18/26</a:t>
             </a:fld>
             <a:endParaRPr lang="en-US"/>
           </a:p>
@@ -1864,7 +1827,7 @@
           <p:cNvPr id="8" name="Footer Placeholder 7">
             <a:extLst>
               <a:ext uri="{FF2B5EF4-FFF2-40B4-BE49-F238E27FC236}">
-                <a16:creationId xmlns:a16="http://schemas.microsoft.com/office/drawing/2014/main" id="{949D76D8-9033-26CF-BF4C-AECCC685C177}"/>
+                <a16:creationId xmlns:a16="http://schemas.microsoft.com/office/drawing/2014/main" id="{01C70835-A06E-6D36-DC57-3B24AC7ED8F0}"/>
               </a:ext>
             </a:extLst>
           </p:cNvPr>
@@ -1889,7 +1852,7 @@
           <p:cNvPr id="9" name="Slide Number Placeholder 8">
             <a:extLst>
               <a:ext uri="{FF2B5EF4-FFF2-40B4-BE49-F238E27FC236}">
-                <a16:creationId xmlns:a16="http://schemas.microsoft.com/office/drawing/2014/main" id="{E02A06B8-CC1D-542F-D8EB-7625046B91D2}"/>
+                <a16:creationId xmlns:a16="http://schemas.microsoft.com/office/drawing/2014/main" id="{6E422D92-2310-E922-839D-23FB1ACEBB1C}"/>
               </a:ext>
             </a:extLst>
           </p:cNvPr>
@@ -1916,7 +1879,7 @@
     </p:spTree>
     <p:extLst>
       <p:ext uri="{BB962C8B-B14F-4D97-AF65-F5344CB8AC3E}">
-        <p14:creationId xmlns:p14="http://schemas.microsoft.com/office/powerpoint/2010/main" val="3565568749"/>
+        <p14:creationId xmlns:p14="http://schemas.microsoft.com/office/powerpoint/2010/main" val="2173293678"/>
       </p:ext>
     </p:extLst>
   </p:cSld>
@@ -1948,7 +1911,7 @@
           <p:cNvPr id="2" name="Title 1">
             <a:extLst>
               <a:ext uri="{FF2B5EF4-FFF2-40B4-BE49-F238E27FC236}">
-                <a16:creationId xmlns:a16="http://schemas.microsoft.com/office/drawing/2014/main" id="{666A9F42-7FF7-F803-C075-BC4968D35E34}"/>
+                <a16:creationId xmlns:a16="http://schemas.microsoft.com/office/drawing/2014/main" id="{426EFA88-7BC4-EBAA-50B3-9A4943CFAE24}"/>
               </a:ext>
             </a:extLst>
           </p:cNvPr>
@@ -1976,7 +1939,7 @@
           <p:cNvPr id="3" name="Date Placeholder 2">
             <a:extLst>
               <a:ext uri="{FF2B5EF4-FFF2-40B4-BE49-F238E27FC236}">
-                <a16:creationId xmlns:a16="http://schemas.microsoft.com/office/drawing/2014/main" id="{E89E8268-7232-2944-F1BD-399F9419B563}"/>
+                <a16:creationId xmlns:a16="http://schemas.microsoft.com/office/drawing/2014/main" id="{ADA02B77-CB11-FA16-29BD-131442154D14}"/>
               </a:ext>
             </a:extLst>
           </p:cNvPr>
@@ -1994,7 +1957,7 @@
           <a:p>
             <a:fld id="{2D6B226B-77A6-410C-9796-083F278E0125}" type="datetime1">
               <a:rPr lang="en-US" smtClean="0"/>
-              <a:t>1/15/26</a:t>
+              <a:t>1/18/26</a:t>
             </a:fld>
             <a:endParaRPr lang="en-US"/>
           </a:p>
@@ -2005,7 +1968,7 @@
           <p:cNvPr id="4" name="Footer Placeholder 3">
             <a:extLst>
               <a:ext uri="{FF2B5EF4-FFF2-40B4-BE49-F238E27FC236}">
-                <a16:creationId xmlns:a16="http://schemas.microsoft.com/office/drawing/2014/main" id="{6B968DDD-323F-89A1-84E3-DDBA626D9386}"/>
+                <a16:creationId xmlns:a16="http://schemas.microsoft.com/office/drawing/2014/main" id="{26B2E246-FEA9-D1F4-EBCB-0D2F9D49516C}"/>
               </a:ext>
             </a:extLst>
           </p:cNvPr>
@@ -2030,7 +1993,7 @@
           <p:cNvPr id="5" name="Slide Number Placeholder 4">
             <a:extLst>
               <a:ext uri="{FF2B5EF4-FFF2-40B4-BE49-F238E27FC236}">
-                <a16:creationId xmlns:a16="http://schemas.microsoft.com/office/drawing/2014/main" id="{98FBDC76-671D-1671-DCE2-D5658BD40E29}"/>
+                <a16:creationId xmlns:a16="http://schemas.microsoft.com/office/drawing/2014/main" id="{FAD32579-7BB9-B6C0-820D-BE358A5863E3}"/>
               </a:ext>
             </a:extLst>
           </p:cNvPr>
@@ -2057,7 +2020,7 @@
     </p:spTree>
     <p:extLst>
       <p:ext uri="{BB962C8B-B14F-4D97-AF65-F5344CB8AC3E}">
-        <p14:creationId xmlns:p14="http://schemas.microsoft.com/office/powerpoint/2010/main" val="2404723030"/>
+        <p14:creationId xmlns:p14="http://schemas.microsoft.com/office/powerpoint/2010/main" val="2453347104"/>
       </p:ext>
     </p:extLst>
   </p:cSld>
@@ -2089,7 +2052,7 @@
           <p:cNvPr id="2" name="Date Placeholder 1">
             <a:extLst>
               <a:ext uri="{FF2B5EF4-FFF2-40B4-BE49-F238E27FC236}">
-                <a16:creationId xmlns:a16="http://schemas.microsoft.com/office/drawing/2014/main" id="{49BC4D82-0182-501C-9231-46767680476E}"/>
+                <a16:creationId xmlns:a16="http://schemas.microsoft.com/office/drawing/2014/main" id="{A6D778CF-9939-519F-4118-E372C81FB96E}"/>
               </a:ext>
             </a:extLst>
           </p:cNvPr>
@@ -2107,7 +2070,7 @@
           <a:p>
             <a:fld id="{A23A578B-D289-4C40-8593-3D356C49DA58}" type="datetime1">
               <a:rPr lang="en-US" smtClean="0"/>
-              <a:t>1/15/26</a:t>
+              <a:t>1/18/26</a:t>
             </a:fld>
             <a:endParaRPr lang="en-US"/>
           </a:p>
@@ -2118,7 +2081,7 @@
           <p:cNvPr id="3" name="Footer Placeholder 2">
             <a:extLst>
               <a:ext uri="{FF2B5EF4-FFF2-40B4-BE49-F238E27FC236}">
-                <a16:creationId xmlns:a16="http://schemas.microsoft.com/office/drawing/2014/main" id="{10EAA6C9-A7F3-19F1-D17C-A1D83FAF553F}"/>
+                <a16:creationId xmlns:a16="http://schemas.microsoft.com/office/drawing/2014/main" id="{FBE28893-F1F5-B741-1316-B2B4DEB9CEEC}"/>
               </a:ext>
             </a:extLst>
           </p:cNvPr>
@@ -2143,7 +2106,7 @@
           <p:cNvPr id="4" name="Slide Number Placeholder 3">
             <a:extLst>
               <a:ext uri="{FF2B5EF4-FFF2-40B4-BE49-F238E27FC236}">
-                <a16:creationId xmlns:a16="http://schemas.microsoft.com/office/drawing/2014/main" id="{34EBB816-1B94-116F-92D4-6043AE9E0C6B}"/>
+                <a16:creationId xmlns:a16="http://schemas.microsoft.com/office/drawing/2014/main" id="{30A3C4A4-D1D8-7786-1BF7-1A0479AAE814}"/>
               </a:ext>
             </a:extLst>
           </p:cNvPr>
@@ -2170,7 +2133,7 @@
     </p:spTree>
     <p:extLst>
       <p:ext uri="{BB962C8B-B14F-4D97-AF65-F5344CB8AC3E}">
-        <p14:creationId xmlns:p14="http://schemas.microsoft.com/office/powerpoint/2010/main" val="1649663389"/>
+        <p14:creationId xmlns:p14="http://schemas.microsoft.com/office/powerpoint/2010/main" val="1166305620"/>
       </p:ext>
     </p:extLst>
   </p:cSld>
@@ -2202,7 +2165,7 @@
           <p:cNvPr id="2" name="Title 1">
             <a:extLst>
               <a:ext uri="{FF2B5EF4-FFF2-40B4-BE49-F238E27FC236}">
-                <a16:creationId xmlns:a16="http://schemas.microsoft.com/office/drawing/2014/main" id="{C350C37F-77BE-E128-4248-D001C39E79C6}"/>
+                <a16:creationId xmlns:a16="http://schemas.microsoft.com/office/drawing/2014/main" id="{71D1ABF9-06D2-55BA-21BE-ACA064195166}"/>
               </a:ext>
             </a:extLst>
           </p:cNvPr>
@@ -2215,17 +2178,15 @@
         </p:nvSpPr>
         <p:spPr>
           <a:xfrm>
-            <a:off x="597160" y="553616"/>
-            <a:ext cx="3595634" cy="1757505"/>
+            <a:off x="839788" y="457200"/>
+            <a:ext cx="3932237" cy="1600200"/>
           </a:xfrm>
         </p:spPr>
         <p:txBody>
-          <a:bodyPr anchor="t">
-            <a:normAutofit/>
-          </a:bodyPr>
+          <a:bodyPr anchor="b"/>
           <a:lstStyle>
             <a:lvl1pPr>
-              <a:defRPr sz="2800"/>
+              <a:defRPr sz="3200"/>
             </a:lvl1pPr>
           </a:lstStyle>
           <a:p>
@@ -2233,7 +2194,6 @@
               <a:rPr lang="en-US"/>
               <a:t>Click to edit Master title style</a:t>
             </a:r>
-            <a:endParaRPr lang="en-US" dirty="0"/>
           </a:p>
         </p:txBody>
       </p:sp>
@@ -2242,7 +2202,7 @@
           <p:cNvPr id="3" name="Content Placeholder 2">
             <a:extLst>
               <a:ext uri="{FF2B5EF4-FFF2-40B4-BE49-F238E27FC236}">
-                <a16:creationId xmlns:a16="http://schemas.microsoft.com/office/drawing/2014/main" id="{2F3B20A8-A604-C977-02C0-083BA8663484}"/>
+                <a16:creationId xmlns:a16="http://schemas.microsoft.com/office/drawing/2014/main" id="{D3F32970-687D-C1E1-BB1E-B6D84B23119B}"/>
               </a:ext>
             </a:extLst>
           </p:cNvPr>
@@ -2255,29 +2215,27 @@
         </p:nvSpPr>
         <p:spPr>
           <a:xfrm>
-            <a:off x="5134708" y="553616"/>
-            <a:ext cx="6279741" cy="5486400"/>
+            <a:off x="5183188" y="987425"/>
+            <a:ext cx="6172200" cy="4873625"/>
           </a:xfrm>
         </p:spPr>
         <p:txBody>
-          <a:bodyPr>
-            <a:normAutofit/>
-          </a:bodyPr>
+          <a:bodyPr/>
           <a:lstStyle>
             <a:lvl1pPr>
-              <a:defRPr sz="2800"/>
+              <a:defRPr sz="3200"/>
             </a:lvl1pPr>
             <a:lvl2pPr>
-              <a:defRPr sz="2400"/>
+              <a:defRPr sz="2800"/>
             </a:lvl2pPr>
             <a:lvl3pPr>
-              <a:defRPr sz="2000"/>
+              <a:defRPr sz="2400"/>
             </a:lvl3pPr>
             <a:lvl4pPr>
-              <a:defRPr sz="1800"/>
+              <a:defRPr sz="2000"/>
             </a:lvl4pPr>
             <a:lvl5pPr>
-              <a:defRPr sz="1800"/>
+              <a:defRPr sz="2000"/>
             </a:lvl5pPr>
             <a:lvl6pPr>
               <a:defRPr sz="2000"/>
@@ -2326,7 +2284,6 @@
               <a:rPr lang="en-US"/>
               <a:t>Fifth level</a:t>
             </a:r>
-            <a:endParaRPr lang="en-US" dirty="0"/>
           </a:p>
         </p:txBody>
       </p:sp>
@@ -2335,7 +2292,7 @@
           <p:cNvPr id="4" name="Text Placeholder 3">
             <a:extLst>
               <a:ext uri="{FF2B5EF4-FFF2-40B4-BE49-F238E27FC236}">
-                <a16:creationId xmlns:a16="http://schemas.microsoft.com/office/drawing/2014/main" id="{EC0EEBFB-2026-6A35-33ED-F008376B67A0}"/>
+                <a16:creationId xmlns:a16="http://schemas.microsoft.com/office/drawing/2014/main" id="{DB792C19-6CE4-4855-7F02-642CF561A1DD}"/>
               </a:ext>
             </a:extLst>
           </p:cNvPr>
@@ -2348,18 +2305,16 @@
         </p:nvSpPr>
         <p:spPr>
           <a:xfrm>
-            <a:off x="597160" y="2311121"/>
-            <a:ext cx="3595634" cy="3728895"/>
+            <a:off x="839788" y="2057400"/>
+            <a:ext cx="3932237" cy="3811588"/>
           </a:xfrm>
         </p:spPr>
         <p:txBody>
-          <a:bodyPr anchor="t">
-            <a:normAutofit/>
-          </a:bodyPr>
+          <a:bodyPr/>
           <a:lstStyle>
             <a:lvl1pPr marL="0" indent="0">
               <a:buNone/>
-              <a:defRPr sz="1800"/>
+              <a:defRPr sz="1600"/>
             </a:lvl1pPr>
             <a:lvl2pPr marL="457200" indent="0">
               <a:buNone/>
@@ -2408,7 +2363,7 @@
           <p:cNvPr id="5" name="Date Placeholder 4">
             <a:extLst>
               <a:ext uri="{FF2B5EF4-FFF2-40B4-BE49-F238E27FC236}">
-                <a16:creationId xmlns:a16="http://schemas.microsoft.com/office/drawing/2014/main" id="{93F05638-7A56-469A-825A-1DFA600254C8}"/>
+                <a16:creationId xmlns:a16="http://schemas.microsoft.com/office/drawing/2014/main" id="{49083F97-6F6E-1FB4-541E-D61B1FEC9D08}"/>
               </a:ext>
             </a:extLst>
           </p:cNvPr>
@@ -2426,7 +2381,7 @@
           <a:p>
             <a:fld id="{713DFAE3-14DB-48A7-A80F-80DDB072CE3D}" type="datetime1">
               <a:rPr lang="en-US" smtClean="0"/>
-              <a:t>1/15/26</a:t>
+              <a:t>1/18/26</a:t>
             </a:fld>
             <a:endParaRPr lang="en-US"/>
           </a:p>
@@ -2437,7 +2392,7 @@
           <p:cNvPr id="6" name="Footer Placeholder 5">
             <a:extLst>
               <a:ext uri="{FF2B5EF4-FFF2-40B4-BE49-F238E27FC236}">
-                <a16:creationId xmlns:a16="http://schemas.microsoft.com/office/drawing/2014/main" id="{9C85A215-184B-2105-0279-ED02F6445831}"/>
+                <a16:creationId xmlns:a16="http://schemas.microsoft.com/office/drawing/2014/main" id="{527A99D6-274B-D6D4-D23D-9B35A1A1B6E6}"/>
               </a:ext>
             </a:extLst>
           </p:cNvPr>
@@ -2462,7 +2417,7 @@
           <p:cNvPr id="7" name="Slide Number Placeholder 6">
             <a:extLst>
               <a:ext uri="{FF2B5EF4-FFF2-40B4-BE49-F238E27FC236}">
-                <a16:creationId xmlns:a16="http://schemas.microsoft.com/office/drawing/2014/main" id="{32C7CA46-892B-253A-3A28-7414E17B837B}"/>
+                <a16:creationId xmlns:a16="http://schemas.microsoft.com/office/drawing/2014/main" id="{6AB1ADE2-F1A2-C4F3-C875-627759A2D7F4}"/>
               </a:ext>
             </a:extLst>
           </p:cNvPr>
@@ -2489,7 +2444,7 @@
     </p:spTree>
     <p:extLst>
       <p:ext uri="{BB962C8B-B14F-4D97-AF65-F5344CB8AC3E}">
-        <p14:creationId xmlns:p14="http://schemas.microsoft.com/office/powerpoint/2010/main" val="3319243255"/>
+        <p14:creationId xmlns:p14="http://schemas.microsoft.com/office/powerpoint/2010/main" val="182209780"/>
       </p:ext>
     </p:extLst>
   </p:cSld>
@@ -2521,7 +2476,7 @@
           <p:cNvPr id="2" name="Title 1">
             <a:extLst>
               <a:ext uri="{FF2B5EF4-FFF2-40B4-BE49-F238E27FC236}">
-                <a16:creationId xmlns:a16="http://schemas.microsoft.com/office/drawing/2014/main" id="{EFB06A09-98CF-FAC2-3708-AECC4360C651}"/>
+                <a16:creationId xmlns:a16="http://schemas.microsoft.com/office/drawing/2014/main" id="{6229FC01-70A5-D138-556B-CA939DEDAF34}"/>
               </a:ext>
             </a:extLst>
           </p:cNvPr>
@@ -2534,17 +2489,15 @@
         </p:nvSpPr>
         <p:spPr>
           <a:xfrm>
-            <a:off x="594360" y="557784"/>
-            <a:ext cx="3595634" cy="2212313"/>
+            <a:off x="839788" y="457200"/>
+            <a:ext cx="3932237" cy="1600200"/>
           </a:xfrm>
         </p:spPr>
         <p:txBody>
-          <a:bodyPr anchor="t">
-            <a:normAutofit/>
-          </a:bodyPr>
+          <a:bodyPr anchor="b"/>
           <a:lstStyle>
             <a:lvl1pPr>
-              <a:defRPr sz="2800"/>
+              <a:defRPr sz="3200"/>
             </a:lvl1pPr>
           </a:lstStyle>
           <a:p>
@@ -2552,7 +2505,6 @@
               <a:rPr lang="en-US"/>
               <a:t>Click to edit Master title style</a:t>
             </a:r>
-            <a:endParaRPr lang="en-US" dirty="0"/>
           </a:p>
         </p:txBody>
       </p:sp>
@@ -2561,7 +2513,7 @@
           <p:cNvPr id="3" name="Picture Placeholder 2">
             <a:extLst>
               <a:ext uri="{FF2B5EF4-FFF2-40B4-BE49-F238E27FC236}">
-                <a16:creationId xmlns:a16="http://schemas.microsoft.com/office/drawing/2014/main" id="{9571C769-CEC8-962A-01E6-15B0E056791E}"/>
+                <a16:creationId xmlns:a16="http://schemas.microsoft.com/office/drawing/2014/main" id="{E2EAF073-DBF6-8F9C-5E23-4CA07E6D6F24}"/>
               </a:ext>
             </a:extLst>
           </p:cNvPr>
@@ -2574,8 +2526,8 @@
         </p:nvSpPr>
         <p:spPr>
           <a:xfrm>
-            <a:off x="5063319" y="657103"/>
-            <a:ext cx="6483687" cy="5555904"/>
+            <a:off x="5183188" y="987425"/>
+            <a:ext cx="6172200" cy="4873625"/>
           </a:xfrm>
         </p:spPr>
         <p:txBody>
@@ -2619,10 +2571,7 @@
             </a:lvl9pPr>
           </a:lstStyle>
           <a:p>
-            <a:r>
-              <a:rPr lang="en-US"/>
-              <a:t>Click icon to add picture</a:t>
-            </a:r>
+            <a:endParaRPr lang="en-US"/>
           </a:p>
         </p:txBody>
       </p:sp>
@@ -2631,7 +2580,7 @@
           <p:cNvPr id="4" name="Text Placeholder 3">
             <a:extLst>
               <a:ext uri="{FF2B5EF4-FFF2-40B4-BE49-F238E27FC236}">
-                <a16:creationId xmlns:a16="http://schemas.microsoft.com/office/drawing/2014/main" id="{F32C4A61-EF2A-C5A5-B150-4448600B3937}"/>
+                <a16:creationId xmlns:a16="http://schemas.microsoft.com/office/drawing/2014/main" id="{76FF495B-916D-8B17-972E-B722E237641F}"/>
               </a:ext>
             </a:extLst>
           </p:cNvPr>
@@ -2644,12 +2593,12 @@
         </p:nvSpPr>
         <p:spPr>
           <a:xfrm>
-            <a:off x="609601" y="2826137"/>
-            <a:ext cx="3585586" cy="3434638"/>
+            <a:off x="839788" y="2057400"/>
+            <a:ext cx="3932237" cy="3811588"/>
           </a:xfrm>
         </p:spPr>
         <p:txBody>
-          <a:bodyPr anchor="b"/>
+          <a:bodyPr/>
           <a:lstStyle>
             <a:lvl1pPr marL="0" indent="0">
               <a:buNone/>
@@ -2702,7 +2651,7 @@
           <p:cNvPr id="5" name="Date Placeholder 4">
             <a:extLst>
               <a:ext uri="{FF2B5EF4-FFF2-40B4-BE49-F238E27FC236}">
-                <a16:creationId xmlns:a16="http://schemas.microsoft.com/office/drawing/2014/main" id="{920B235E-39C7-4C78-20EF-DB48ECD9CB90}"/>
+                <a16:creationId xmlns:a16="http://schemas.microsoft.com/office/drawing/2014/main" id="{AC2A4CAB-F190-CFEF-E873-2D5A9B8EB483}"/>
               </a:ext>
             </a:extLst>
           </p:cNvPr>
@@ -2720,7 +2669,7 @@
           <a:p>
             <a:fld id="{92C5EAEF-6478-4102-8F5D-A5FE9FC97ACB}" type="datetime1">
               <a:rPr lang="en-US" smtClean="0"/>
-              <a:t>1/15/26</a:t>
+              <a:t>1/18/26</a:t>
             </a:fld>
             <a:endParaRPr lang="en-US"/>
           </a:p>
@@ -2731,7 +2680,7 @@
           <p:cNvPr id="6" name="Footer Placeholder 5">
             <a:extLst>
               <a:ext uri="{FF2B5EF4-FFF2-40B4-BE49-F238E27FC236}">
-                <a16:creationId xmlns:a16="http://schemas.microsoft.com/office/drawing/2014/main" id="{7FDC75DA-9A78-9AB9-7171-95A08CC51C56}"/>
+                <a16:creationId xmlns:a16="http://schemas.microsoft.com/office/drawing/2014/main" id="{8F70ED8C-E966-E3B9-2382-BB3128D4CFDB}"/>
               </a:ext>
             </a:extLst>
           </p:cNvPr>
@@ -2756,7 +2705,7 @@
           <p:cNvPr id="7" name="Slide Number Placeholder 6">
             <a:extLst>
               <a:ext uri="{FF2B5EF4-FFF2-40B4-BE49-F238E27FC236}">
-                <a16:creationId xmlns:a16="http://schemas.microsoft.com/office/drawing/2014/main" id="{5EFE1A03-DCCB-53C7-DBFE-2AD55C90591B}"/>
+                <a16:creationId xmlns:a16="http://schemas.microsoft.com/office/drawing/2014/main" id="{DF55CD15-5CC3-6746-CE63-465720F86EC2}"/>
               </a:ext>
             </a:extLst>
           </p:cNvPr>
@@ -2783,7 +2732,7 @@
     </p:spTree>
     <p:extLst>
       <p:ext uri="{BB962C8B-B14F-4D97-AF65-F5344CB8AC3E}">
-        <p14:creationId xmlns:p14="http://schemas.microsoft.com/office/powerpoint/2010/main" val="2940103389"/>
+        <p14:creationId xmlns:p14="http://schemas.microsoft.com/office/powerpoint/2010/main" val="3802128353"/>
       </p:ext>
     </p:extLst>
   </p:cSld>
@@ -2820,7 +2769,7 @@
           <p:cNvPr id="2" name="Title Placeholder 1">
             <a:extLst>
               <a:ext uri="{FF2B5EF4-FFF2-40B4-BE49-F238E27FC236}">
-                <a16:creationId xmlns:a16="http://schemas.microsoft.com/office/drawing/2014/main" id="{475BFB69-9245-EC58-F1DE-FEB625BD336A}"/>
+                <a16:creationId xmlns:a16="http://schemas.microsoft.com/office/drawing/2014/main" id="{BA2A7A92-7DEF-6894-BE7B-D4968CB7D12B}"/>
               </a:ext>
             </a:extLst>
           </p:cNvPr>
@@ -2833,15 +2782,15 @@
         </p:nvSpPr>
         <p:spPr>
           <a:xfrm>
-            <a:off x="612648" y="548640"/>
-            <a:ext cx="10653578" cy="1132258"/>
+            <a:off x="838200" y="365125"/>
+            <a:ext cx="10515600" cy="1325563"/>
           </a:xfrm>
           <a:prstGeom prst="rect">
             <a:avLst/>
           </a:prstGeom>
         </p:spPr>
         <p:txBody>
-          <a:bodyPr vert="horz" lIns="91440" tIns="45720" rIns="91440" bIns="45720" rtlCol="0" anchor="t">
+          <a:bodyPr vert="horz" lIns="91440" tIns="45720" rIns="91440" bIns="45720" rtlCol="0" anchor="ctr">
             <a:normAutofit/>
           </a:bodyPr>
           <a:lstStyle/>
@@ -2850,7 +2799,6 @@
               <a:rPr lang="en-US"/>
               <a:t>Click to edit Master title style</a:t>
             </a:r>
-            <a:endParaRPr lang="en-US" dirty="0"/>
           </a:p>
         </p:txBody>
       </p:sp>
@@ -2859,7 +2807,7 @@
           <p:cNvPr id="3" name="Text Placeholder 2">
             <a:extLst>
               <a:ext uri="{FF2B5EF4-FFF2-40B4-BE49-F238E27FC236}">
-                <a16:creationId xmlns:a16="http://schemas.microsoft.com/office/drawing/2014/main" id="{5516AFD5-5144-C460-0CA4-644BC4A93C02}"/>
+                <a16:creationId xmlns:a16="http://schemas.microsoft.com/office/drawing/2014/main" id="{DEF0A311-FF23-6073-8F3C-AFF8DE5F7625}"/>
               </a:ext>
             </a:extLst>
           </p:cNvPr>
@@ -2872,8 +2820,8 @@
         </p:nvSpPr>
         <p:spPr>
           <a:xfrm>
-            <a:off x="612647" y="1715532"/>
-            <a:ext cx="10653579" cy="4593828"/>
+            <a:off x="838200" y="1825625"/>
+            <a:ext cx="10515600" cy="4351338"/>
           </a:xfrm>
           <a:prstGeom prst="rect">
             <a:avLst/>
@@ -2918,7 +2866,6 @@
               <a:rPr lang="en-US"/>
               <a:t>Fifth level</a:t>
             </a:r>
-            <a:endParaRPr lang="en-US" dirty="0"/>
           </a:p>
         </p:txBody>
       </p:sp>
@@ -2927,7 +2874,7 @@
           <p:cNvPr id="4" name="Date Placeholder 3">
             <a:extLst>
               <a:ext uri="{FF2B5EF4-FFF2-40B4-BE49-F238E27FC236}">
-                <a16:creationId xmlns:a16="http://schemas.microsoft.com/office/drawing/2014/main" id="{3995753E-AF8A-7E04-8A1A-205B755A0215}"/>
+                <a16:creationId xmlns:a16="http://schemas.microsoft.com/office/drawing/2014/main" id="{FFCADE31-CEC7-F53D-0CFE-D8408245DED5}"/>
               </a:ext>
             </a:extLst>
           </p:cNvPr>
@@ -2940,8 +2887,8 @@
         </p:nvSpPr>
         <p:spPr>
           <a:xfrm>
-            <a:off x="137160" y="6453002"/>
-            <a:ext cx="3494314" cy="365125"/>
+            <a:off x="838200" y="6356350"/>
+            <a:ext cx="2743200" cy="365125"/>
           </a:xfrm>
           <a:prstGeom prst="rect">
             <a:avLst/>
@@ -2951,9 +2898,11 @@
           <a:bodyPr vert="horz" lIns="91440" tIns="45720" rIns="91440" bIns="45720" rtlCol="0" anchor="ctr"/>
           <a:lstStyle>
             <a:lvl1pPr algn="l">
-              <a:defRPr sz="900">
+              <a:defRPr sz="1200">
                 <a:solidFill>
-                  <a:schemeClr val="tx1"/>
+                  <a:schemeClr val="tx1">
+                    <a:tint val="82000"/>
+                  </a:schemeClr>
                 </a:solidFill>
               </a:defRPr>
             </a:lvl1pPr>
@@ -2961,7 +2910,7 @@
           <a:p>
             <a:fld id="{67F45AC6-C491-4585-A584-9CE2AF7D5500}" type="datetime1">
               <a:rPr lang="en-US" smtClean="0"/>
-              <a:t>1/15/26</a:t>
+              <a:t>1/18/26</a:t>
             </a:fld>
             <a:endParaRPr lang="en-US"/>
           </a:p>
@@ -2972,7 +2921,7 @@
           <p:cNvPr id="5" name="Footer Placeholder 4">
             <a:extLst>
               <a:ext uri="{FF2B5EF4-FFF2-40B4-BE49-F238E27FC236}">
-                <a16:creationId xmlns:a16="http://schemas.microsoft.com/office/drawing/2014/main" id="{D4E1B7C8-DA74-800B-EE14-A39E9DB32DE4}"/>
+                <a16:creationId xmlns:a16="http://schemas.microsoft.com/office/drawing/2014/main" id="{34ED2CDB-38B7-3DBA-E218-641B6E63A838}"/>
               </a:ext>
             </a:extLst>
           </p:cNvPr>
@@ -2985,8 +2934,8 @@
         </p:nvSpPr>
         <p:spPr>
           <a:xfrm>
-            <a:off x="8876521" y="6453002"/>
-            <a:ext cx="2805405" cy="365125"/>
+            <a:off x="4038600" y="6356350"/>
+            <a:ext cx="4114800" cy="365125"/>
           </a:xfrm>
           <a:prstGeom prst="rect">
             <a:avLst/>
@@ -2995,10 +2944,12 @@
         <p:txBody>
           <a:bodyPr vert="horz" lIns="91440" tIns="45720" rIns="91440" bIns="45720" rtlCol="0" anchor="ctr"/>
           <a:lstStyle>
-            <a:lvl1pPr algn="r">
-              <a:defRPr sz="900">
+            <a:lvl1pPr algn="ctr">
+              <a:defRPr sz="1200">
                 <a:solidFill>
-                  <a:schemeClr val="tx1"/>
+                  <a:schemeClr val="tx1">
+                    <a:tint val="82000"/>
+                  </a:schemeClr>
                 </a:solidFill>
               </a:defRPr>
             </a:lvl1pPr>
@@ -3013,7 +2964,7 @@
           <p:cNvPr id="6" name="Slide Number Placeholder 5">
             <a:extLst>
               <a:ext uri="{FF2B5EF4-FFF2-40B4-BE49-F238E27FC236}">
-                <a16:creationId xmlns:a16="http://schemas.microsoft.com/office/drawing/2014/main" id="{7AC1647D-0DF0-CA1B-F723-EF7B8F508DB7}"/>
+                <a16:creationId xmlns:a16="http://schemas.microsoft.com/office/drawing/2014/main" id="{C9DF833C-DDD8-3886-2686-0B98422157A2}"/>
               </a:ext>
             </a:extLst>
           </p:cNvPr>
@@ -3026,8 +2977,8 @@
         </p:nvSpPr>
         <p:spPr>
           <a:xfrm>
-            <a:off x="11632162" y="6453002"/>
-            <a:ext cx="429207" cy="365125"/>
+            <a:off x="8610600" y="6356350"/>
+            <a:ext cx="2743200" cy="365125"/>
           </a:xfrm>
           <a:prstGeom prst="rect">
             <a:avLst/>
@@ -3037,9 +2988,11 @@
           <a:bodyPr vert="horz" lIns="91440" tIns="45720" rIns="91440" bIns="45720" rtlCol="0" anchor="ctr"/>
           <a:lstStyle>
             <a:lvl1pPr algn="r">
-              <a:defRPr sz="900">
+              <a:defRPr sz="1200">
                 <a:solidFill>
-                  <a:schemeClr val="tx1"/>
+                  <a:schemeClr val="tx1">
+                    <a:tint val="82000"/>
+                  </a:schemeClr>
                 </a:solidFill>
               </a:defRPr>
             </a:lvl1pPr>
@@ -3056,23 +3009,23 @@
     </p:spTree>
     <p:extLst>
       <p:ext uri="{BB962C8B-B14F-4D97-AF65-F5344CB8AC3E}">
-        <p14:creationId xmlns:p14="http://schemas.microsoft.com/office/powerpoint/2010/main" val="1347039455"/>
+        <p14:creationId xmlns:p14="http://schemas.microsoft.com/office/powerpoint/2010/main" val="3175769557"/>
       </p:ext>
     </p:extLst>
   </p:cSld>
   <p:clrMap bg1="lt1" tx1="dk1" bg2="lt2" tx2="dk2" accent1="accent1" accent2="accent2" accent3="accent3" accent4="accent4" accent5="accent5" accent6="accent6" hlink="hlink" folHlink="folHlink"/>
   <p:sldLayoutIdLst>
-    <p:sldLayoutId id="2147483662" r:id="rId1"/>
-    <p:sldLayoutId id="2147483663" r:id="rId2"/>
-    <p:sldLayoutId id="2147483664" r:id="rId3"/>
-    <p:sldLayoutId id="2147483665" r:id="rId4"/>
-    <p:sldLayoutId id="2147483666" r:id="rId5"/>
-    <p:sldLayoutId id="2147483672" r:id="rId6"/>
-    <p:sldLayoutId id="2147483667" r:id="rId7"/>
-    <p:sldLayoutId id="2147483668" r:id="rId8"/>
-    <p:sldLayoutId id="2147483669" r:id="rId9"/>
-    <p:sldLayoutId id="2147483671" r:id="rId10"/>
-    <p:sldLayoutId id="2147483670" r:id="rId11"/>
+    <p:sldLayoutId id="2147483675" r:id="rId1"/>
+    <p:sldLayoutId id="2147483676" r:id="rId2"/>
+    <p:sldLayoutId id="2147483677" r:id="rId3"/>
+    <p:sldLayoutId id="2147483678" r:id="rId4"/>
+    <p:sldLayoutId id="2147483679" r:id="rId5"/>
+    <p:sldLayoutId id="2147483680" r:id="rId6"/>
+    <p:sldLayoutId id="2147483681" r:id="rId7"/>
+    <p:sldLayoutId id="2147483682" r:id="rId8"/>
+    <p:sldLayoutId id="2147483683" r:id="rId9"/>
+    <p:sldLayoutId id="2147483684" r:id="rId10"/>
+    <p:sldLayoutId id="2147483685" r:id="rId11"/>
   </p:sldLayoutIdLst>
   <p:hf sldNum="0" hdr="0" ftr="0" dt="0"/>
   <p:txStyles>
@@ -3085,7 +3038,7 @@
           <a:spcPct val="0"/>
         </a:spcBef>
         <a:buNone/>
-        <a:defRPr sz="3600" b="1" kern="1200">
+        <a:defRPr sz="4400" kern="1200">
           <a:solidFill>
             <a:schemeClr val="tx1"/>
           </a:solidFill>
@@ -3098,10 +3051,46 @@
     <p:bodyStyle>
       <a:lvl1pPr marL="228600" indent="-228600" algn="l" defTabSz="914400" rtl="0" eaLnBrk="1" latinLnBrk="0" hangingPunct="1">
         <a:lnSpc>
-          <a:spcPct val="120000"/>
+          <a:spcPct val="90000"/>
         </a:lnSpc>
         <a:spcBef>
           <a:spcPts val="1000"/>
+        </a:spcBef>
+        <a:buFont typeface="Arial" panose="020B0604020202020204" pitchFamily="34" charset="0"/>
+        <a:buChar char="•"/>
+        <a:defRPr sz="2800" kern="1200">
+          <a:solidFill>
+            <a:schemeClr val="tx1"/>
+          </a:solidFill>
+          <a:latin typeface="+mn-lt"/>
+          <a:ea typeface="+mn-ea"/>
+          <a:cs typeface="+mn-cs"/>
+        </a:defRPr>
+      </a:lvl1pPr>
+      <a:lvl2pPr marL="685800" indent="-228600" algn="l" defTabSz="914400" rtl="0" eaLnBrk="1" latinLnBrk="0" hangingPunct="1">
+        <a:lnSpc>
+          <a:spcPct val="90000"/>
+        </a:lnSpc>
+        <a:spcBef>
+          <a:spcPts val="500"/>
+        </a:spcBef>
+        <a:buFont typeface="Arial" panose="020B0604020202020204" pitchFamily="34" charset="0"/>
+        <a:buChar char="•"/>
+        <a:defRPr sz="2400" kern="1200">
+          <a:solidFill>
+            <a:schemeClr val="tx1"/>
+          </a:solidFill>
+          <a:latin typeface="+mn-lt"/>
+          <a:ea typeface="+mn-ea"/>
+          <a:cs typeface="+mn-cs"/>
+        </a:defRPr>
+      </a:lvl2pPr>
+      <a:lvl3pPr marL="1143000" indent="-228600" algn="l" defTabSz="914400" rtl="0" eaLnBrk="1" latinLnBrk="0" hangingPunct="1">
+        <a:lnSpc>
+          <a:spcPct val="90000"/>
+        </a:lnSpc>
+        <a:spcBef>
+          <a:spcPts val="500"/>
         </a:spcBef>
         <a:buFont typeface="Arial" panose="020B0604020202020204" pitchFamily="34" charset="0"/>
         <a:buChar char="•"/>
@@ -3113,10 +3102,10 @@
           <a:ea typeface="+mn-ea"/>
           <a:cs typeface="+mn-cs"/>
         </a:defRPr>
-      </a:lvl1pPr>
-      <a:lvl2pPr marL="457200" indent="-228600" algn="l" defTabSz="914400" rtl="0" eaLnBrk="1" latinLnBrk="0" hangingPunct="1">
+      </a:lvl3pPr>
+      <a:lvl4pPr marL="1600200" indent="-228600" algn="l" defTabSz="914400" rtl="0" eaLnBrk="1" latinLnBrk="0" hangingPunct="1">
         <a:lnSpc>
-          <a:spcPct val="120000"/>
+          <a:spcPct val="90000"/>
         </a:lnSpc>
         <a:spcBef>
           <a:spcPts val="500"/>
@@ -3131,53 +3120,17 @@
           <a:ea typeface="+mn-ea"/>
           <a:cs typeface="+mn-cs"/>
         </a:defRPr>
-      </a:lvl2pPr>
-      <a:lvl3pPr marL="685800" indent="-228600" algn="l" defTabSz="914400" rtl="0" eaLnBrk="1" latinLnBrk="0" hangingPunct="1">
+      </a:lvl4pPr>
+      <a:lvl5pPr marL="2057400" indent="-228600" algn="l" defTabSz="914400" rtl="0" eaLnBrk="1" latinLnBrk="0" hangingPunct="1">
         <a:lnSpc>
-          <a:spcPct val="120000"/>
+          <a:spcPct val="90000"/>
         </a:lnSpc>
         <a:spcBef>
           <a:spcPts val="500"/>
         </a:spcBef>
         <a:buFont typeface="Arial" panose="020B0604020202020204" pitchFamily="34" charset="0"/>
         <a:buChar char="•"/>
-        <a:defRPr sz="1600" kern="1200">
-          <a:solidFill>
-            <a:schemeClr val="tx1"/>
-          </a:solidFill>
-          <a:latin typeface="+mn-lt"/>
-          <a:ea typeface="+mn-ea"/>
-          <a:cs typeface="+mn-cs"/>
-        </a:defRPr>
-      </a:lvl3pPr>
-      <a:lvl4pPr marL="914400" indent="-228600" algn="l" defTabSz="914400" rtl="0" eaLnBrk="1" latinLnBrk="0" hangingPunct="1">
-        <a:lnSpc>
-          <a:spcPct val="120000"/>
-        </a:lnSpc>
-        <a:spcBef>
-          <a:spcPts val="500"/>
-        </a:spcBef>
-        <a:buFont typeface="Arial" panose="020B0604020202020204" pitchFamily="34" charset="0"/>
-        <a:buChar char="•"/>
-        <a:defRPr sz="1400" kern="1200">
-          <a:solidFill>
-            <a:schemeClr val="tx1"/>
-          </a:solidFill>
-          <a:latin typeface="+mn-lt"/>
-          <a:ea typeface="+mn-ea"/>
-          <a:cs typeface="+mn-cs"/>
-        </a:defRPr>
-      </a:lvl4pPr>
-      <a:lvl5pPr marL="1143000" indent="-228600" algn="l" defTabSz="914400" rtl="0" eaLnBrk="1" latinLnBrk="0" hangingPunct="1">
-        <a:lnSpc>
-          <a:spcPct val="120000"/>
-        </a:lnSpc>
-        <a:spcBef>
-          <a:spcPts val="500"/>
-        </a:spcBef>
-        <a:buFont typeface="Arial" panose="020B0604020202020204" pitchFamily="34" charset="0"/>
-        <a:buChar char="•"/>
-        <a:defRPr sz="1200" kern="1200">
+        <a:defRPr sz="1800" kern="1200">
           <a:solidFill>
             <a:schemeClr val="tx1"/>
           </a:solidFill>
@@ -3385,10 +3338,10 @@
       </p:grpSpPr>
       <p:sp useBgFill="1">
         <p:nvSpPr>
-          <p:cNvPr id="9" name="Rectangle 8">
-            <a:extLst>
-              <a:ext uri="{FF2B5EF4-FFF2-40B4-BE49-F238E27FC236}">
-                <a16:creationId xmlns:a16="http://schemas.microsoft.com/office/drawing/2014/main" id="{5E5473D2-DD46-DFAF-84EC-264D6CE58B94}"/>
+          <p:cNvPr id="10" name="Rectangle 9">
+            <a:extLst>
+              <a:ext uri="{FF2B5EF4-FFF2-40B4-BE49-F238E27FC236}">
+                <a16:creationId xmlns:a16="http://schemas.microsoft.com/office/drawing/2014/main" id="{E91DC736-0EF8-4F87-9146-EBF1D2EE4D3D}"/>
               </a:ext>
               <a:ext uri="{C183D7F6-B498-43B3-948B-1728B52AA6E4}">
                 <adec:decorative xmlns:adec="http://schemas.microsoft.com/office/drawing/2017/decorative" val="1"/>
@@ -3414,30 +3367,14 @@
           <a:prstGeom prst="rect">
             <a:avLst/>
           </a:prstGeom>
-          <a:ln w="12700" cap="flat" cmpd="sng" algn="ctr">
+          <a:ln>
             <a:noFill/>
-            <a:prstDash val="solid"/>
-            <a:miter lim="800000"/>
           </a:ln>
-          <a:effectLst/>
-          <a:extLst>
-            <a:ext uri="{91240B29-F687-4F45-9708-019B960494DF}">
-              <a14:hiddenLine xmlns:a14="http://schemas.microsoft.com/office/drawing/2010/main" w="12700" cap="flat" cmpd="sng" algn="ctr">
-                <a:solidFill>
-                  <a:schemeClr val="accent1">
-                    <a:shade val="15000"/>
-                  </a:schemeClr>
-                </a:solidFill>
-                <a:prstDash val="solid"/>
-                <a:miter lim="800000"/>
-              </a14:hiddenLine>
-            </a:ext>
-          </a:extLst>
         </p:spPr>
         <p:style>
           <a:lnRef idx="2">
             <a:schemeClr val="accent1">
-              <a:shade val="15000"/>
+              <a:shade val="50000"/>
             </a:schemeClr>
           </a:lnRef>
           <a:fillRef idx="1">
@@ -3459,108 +3396,6 @@
           </a:p>
         </p:txBody>
       </p:sp>
-      <p:sp>
-        <p:nvSpPr>
-          <p:cNvPr id="2" name="Title 1">
-            <a:extLst>
-              <a:ext uri="{FF2B5EF4-FFF2-40B4-BE49-F238E27FC236}">
-                <a16:creationId xmlns:a16="http://schemas.microsoft.com/office/drawing/2014/main" id="{4C26447B-0BAC-33A7-A4CC-76785FFC9B60}"/>
-              </a:ext>
-            </a:extLst>
-          </p:cNvPr>
-          <p:cNvSpPr>
-            <a:spLocks noGrp="1"/>
-          </p:cNvSpPr>
-          <p:nvPr>
-            <p:ph type="ctrTitle"/>
-          </p:nvPr>
-        </p:nvSpPr>
-        <p:spPr>
-          <a:xfrm>
-            <a:off x="7843394" y="1585762"/>
-            <a:ext cx="3788767" cy="2811737"/>
-          </a:xfrm>
-        </p:spPr>
-        <p:txBody>
-          <a:bodyPr>
-            <a:normAutofit/>
-          </a:bodyPr>
-          <a:lstStyle/>
-          <a:p>
-            <a:pPr algn="l"/>
-            <a:r>
-              <a:rPr lang="en-US" sz="4400" dirty="0">
-                <a:latin typeface="Times New Roman" panose="02020603050405020304" pitchFamily="18" charset="0"/>
-                <a:cs typeface="Times New Roman" panose="02020603050405020304" pitchFamily="18" charset="0"/>
-              </a:rPr>
-              <a:t>&lt;TITLE&gt;</a:t>
-            </a:r>
-          </a:p>
-        </p:txBody>
-      </p:sp>
-      <p:sp>
-        <p:nvSpPr>
-          <p:cNvPr id="3" name="Subtitle 2">
-            <a:extLst>
-              <a:ext uri="{FF2B5EF4-FFF2-40B4-BE49-F238E27FC236}">
-                <a16:creationId xmlns:a16="http://schemas.microsoft.com/office/drawing/2014/main" id="{8F60DF2F-C20B-4C20-7031-99284D69EC71}"/>
-              </a:ext>
-            </a:extLst>
-          </p:cNvPr>
-          <p:cNvSpPr>
-            <a:spLocks noGrp="1"/>
-          </p:cNvSpPr>
-          <p:nvPr>
-            <p:ph type="subTitle" idx="1"/>
-          </p:nvPr>
-        </p:nvSpPr>
-        <p:spPr>
-          <a:xfrm>
-            <a:off x="7843395" y="4524047"/>
-            <a:ext cx="3614857" cy="962354"/>
-          </a:xfrm>
-        </p:spPr>
-        <p:txBody>
-          <a:bodyPr>
-            <a:normAutofit/>
-          </a:bodyPr>
-          <a:lstStyle/>
-          <a:p>
-            <a:pPr algn="l">
-              <a:lnSpc>
-                <a:spcPct val="100000"/>
-              </a:lnSpc>
-              <a:spcBef>
-                <a:spcPts val="600"/>
-              </a:spcBef>
-            </a:pPr>
-            <a:r>
-              <a:rPr lang="en-US" dirty="0">
-                <a:latin typeface="Times New Roman" panose="02020603050405020304" pitchFamily="18" charset="0"/>
-                <a:cs typeface="Times New Roman" panose="02020603050405020304" pitchFamily="18" charset="0"/>
-              </a:rPr>
-              <a:t>Jeong Hoon Choi</a:t>
-            </a:r>
-          </a:p>
-          <a:p>
-            <a:pPr algn="l">
-              <a:lnSpc>
-                <a:spcPct val="100000"/>
-              </a:lnSpc>
-              <a:spcBef>
-                <a:spcPts val="600"/>
-              </a:spcBef>
-            </a:pPr>
-            <a:r>
-              <a:rPr lang="en-US" dirty="0">
-                <a:latin typeface="Times New Roman" panose="02020603050405020304" pitchFamily="18" charset="0"/>
-                <a:cs typeface="Times New Roman" panose="02020603050405020304" pitchFamily="18" charset="0"/>
-              </a:rPr>
-              <a:t>USCID: 5023184813</a:t>
-            </a:r>
-          </a:p>
-        </p:txBody>
-      </p:sp>
       <p:pic>
         <p:nvPicPr>
           <p:cNvPr id="4" name="Picture 3">
@@ -3577,21 +3412,377 @@
         </p:nvPicPr>
         <p:blipFill>
           <a:blip r:embed="rId2"/>
-          <a:srcRect l="19878" r="26406"/>
+          <a:srcRect l="9006" r="32159" b="6907"/>
           <a:stretch>
             <a:fillRect/>
           </a:stretch>
         </p:blipFill>
         <p:spPr>
           <a:xfrm>
-            <a:off x="2" y="10"/>
-            <a:ext cx="7367752" cy="6857990"/>
+            <a:off x="3523488" y="10"/>
+            <a:ext cx="8668512" cy="6857990"/>
           </a:xfrm>
           <a:prstGeom prst="rect">
             <a:avLst/>
           </a:prstGeom>
         </p:spPr>
       </p:pic>
+      <p:sp>
+        <p:nvSpPr>
+          <p:cNvPr id="12" name="Rectangle 11">
+            <a:extLst>
+              <a:ext uri="{FF2B5EF4-FFF2-40B4-BE49-F238E27FC236}">
+                <a16:creationId xmlns:a16="http://schemas.microsoft.com/office/drawing/2014/main" id="{097CD68E-23E3-4007-8847-CD0944C4F7BE}"/>
+              </a:ext>
+              <a:ext uri="{C183D7F6-B498-43B3-948B-1728B52AA6E4}">
+                <adec:decorative xmlns:adec="http://schemas.microsoft.com/office/drawing/2017/decorative" val="1"/>
+              </a:ext>
+            </a:extLst>
+          </p:cNvPr>
+          <p:cNvSpPr>
+            <a:spLocks noGrp="1" noRot="1" noChangeAspect="1" noMove="1" noResize="1" noEditPoints="1" noAdjustHandles="1" noChangeArrowheads="1" noChangeShapeType="1" noTextEdit="1"/>
+          </p:cNvSpPr>
+          <p:nvPr>
+            <p:extLst>
+              <p:ext uri="{386F3935-93C4-4BCD-93E2-E3B085C9AB24}">
+                <p16:designElem xmlns:p16="http://schemas.microsoft.com/office/powerpoint/2015/main" val="1"/>
+              </p:ext>
+            </p:extLst>
+          </p:nvPr>
+        </p:nvSpPr>
+        <p:spPr>
+          <a:xfrm>
+            <a:off x="0" y="0"/>
+            <a:ext cx="9756601" cy="6858000"/>
+          </a:xfrm>
+          <a:prstGeom prst="rect">
+            <a:avLst/>
+          </a:prstGeom>
+          <a:gradFill>
+            <a:gsLst>
+              <a:gs pos="58000">
+                <a:schemeClr val="bg1"/>
+              </a:gs>
+              <a:gs pos="35000">
+                <a:schemeClr val="bg1">
+                  <a:alpha val="79000"/>
+                </a:schemeClr>
+              </a:gs>
+              <a:gs pos="19000">
+                <a:schemeClr val="bg1">
+                  <a:alpha val="38000"/>
+                </a:schemeClr>
+              </a:gs>
+              <a:gs pos="0">
+                <a:schemeClr val="bg1">
+                  <a:alpha val="0"/>
+                </a:schemeClr>
+              </a:gs>
+              <a:gs pos="100000">
+                <a:schemeClr val="bg1"/>
+              </a:gs>
+            </a:gsLst>
+            <a:lin ang="10800000" scaled="0"/>
+          </a:gradFill>
+          <a:ln>
+            <a:noFill/>
+          </a:ln>
+        </p:spPr>
+        <p:style>
+          <a:lnRef idx="2">
+            <a:schemeClr val="accent1">
+              <a:shade val="50000"/>
+            </a:schemeClr>
+          </a:lnRef>
+          <a:fillRef idx="1">
+            <a:schemeClr val="accent1"/>
+          </a:fillRef>
+          <a:effectRef idx="0">
+            <a:schemeClr val="accent1"/>
+          </a:effectRef>
+          <a:fontRef idx="minor">
+            <a:schemeClr val="lt1"/>
+          </a:fontRef>
+        </p:style>
+        <p:txBody>
+          <a:bodyPr rtlCol="0" anchor="ctr"/>
+          <a:lstStyle/>
+          <a:p>
+            <a:pPr algn="ctr"/>
+            <a:endParaRPr lang="en-US" dirty="0"/>
+          </a:p>
+        </p:txBody>
+      </p:sp>
+      <p:sp>
+        <p:nvSpPr>
+          <p:cNvPr id="2" name="Title 1">
+            <a:extLst>
+              <a:ext uri="{FF2B5EF4-FFF2-40B4-BE49-F238E27FC236}">
+                <a16:creationId xmlns:a16="http://schemas.microsoft.com/office/drawing/2014/main" id="{4C26447B-0BAC-33A7-A4CC-76785FFC9B60}"/>
+              </a:ext>
+            </a:extLst>
+          </p:cNvPr>
+          <p:cNvSpPr>
+            <a:spLocks noGrp="1"/>
+          </p:cNvSpPr>
+          <p:nvPr>
+            <p:ph type="ctrTitle"/>
+          </p:nvPr>
+        </p:nvSpPr>
+        <p:spPr>
+          <a:xfrm>
+            <a:off x="477981" y="1122363"/>
+            <a:ext cx="4023360" cy="3204134"/>
+          </a:xfrm>
+        </p:spPr>
+        <p:txBody>
+          <a:bodyPr anchor="b">
+            <a:normAutofit/>
+          </a:bodyPr>
+          <a:lstStyle/>
+          <a:p>
+            <a:pPr algn="l"/>
+            <a:r>
+              <a:rPr lang="en-US" sz="3700" dirty="0">
+                <a:latin typeface="Times New Roman" panose="02020603050405020304" pitchFamily="18" charset="0"/>
+                <a:cs typeface="Times New Roman" panose="02020603050405020304" pitchFamily="18" charset="0"/>
+              </a:rPr>
+              <a:t>CleanML:</a:t>
+            </a:r>
+            <a:br>
+              <a:rPr lang="en-US" sz="3700" dirty="0">
+                <a:latin typeface="Times New Roman" panose="02020603050405020304" pitchFamily="18" charset="0"/>
+                <a:cs typeface="Times New Roman" panose="02020603050405020304" pitchFamily="18" charset="0"/>
+              </a:rPr>
+            </a:br>
+            <a:r>
+              <a:rPr lang="en-US" sz="3700" dirty="0">
+                <a:latin typeface="Times New Roman" panose="02020603050405020304" pitchFamily="18" charset="0"/>
+                <a:cs typeface="Times New Roman" panose="02020603050405020304" pitchFamily="18" charset="0"/>
+              </a:rPr>
+              <a:t>A Study for Evaluating the Impact of Data Cleaning on ML Classification Tasks</a:t>
+            </a:r>
+          </a:p>
+        </p:txBody>
+      </p:sp>
+      <p:sp>
+        <p:nvSpPr>
+          <p:cNvPr id="3" name="Subtitle 2">
+            <a:extLst>
+              <a:ext uri="{FF2B5EF4-FFF2-40B4-BE49-F238E27FC236}">
+                <a16:creationId xmlns:a16="http://schemas.microsoft.com/office/drawing/2014/main" id="{8F60DF2F-C20B-4C20-7031-99284D69EC71}"/>
+              </a:ext>
+            </a:extLst>
+          </p:cNvPr>
+          <p:cNvSpPr>
+            <a:spLocks noGrp="1"/>
+          </p:cNvSpPr>
+          <p:nvPr>
+            <p:ph type="subTitle" idx="1"/>
+          </p:nvPr>
+        </p:nvSpPr>
+        <p:spPr>
+          <a:xfrm>
+            <a:off x="477980" y="4872922"/>
+            <a:ext cx="4023359" cy="1208141"/>
+          </a:xfrm>
+        </p:spPr>
+        <p:txBody>
+          <a:bodyPr>
+            <a:normAutofit/>
+          </a:bodyPr>
+          <a:lstStyle/>
+          <a:p>
+            <a:pPr algn="l">
+              <a:spcBef>
+                <a:spcPts val="600"/>
+              </a:spcBef>
+            </a:pPr>
+            <a:r>
+              <a:rPr lang="en-US" sz="2000">
+                <a:latin typeface="Times New Roman" panose="02020603050405020304" pitchFamily="18" charset="0"/>
+                <a:cs typeface="Times New Roman" panose="02020603050405020304" pitchFamily="18" charset="0"/>
+              </a:rPr>
+              <a:t>Jeong Hoon Choi</a:t>
+            </a:r>
+          </a:p>
+          <a:p>
+            <a:pPr algn="l">
+              <a:spcBef>
+                <a:spcPts val="600"/>
+              </a:spcBef>
+            </a:pPr>
+            <a:r>
+              <a:rPr lang="en-US" sz="2000">
+                <a:latin typeface="Times New Roman" panose="02020603050405020304" pitchFamily="18" charset="0"/>
+                <a:cs typeface="Times New Roman" panose="02020603050405020304" pitchFamily="18" charset="0"/>
+              </a:rPr>
+              <a:t>USCID: 5023184813</a:t>
+            </a:r>
+          </a:p>
+        </p:txBody>
+      </p:sp>
+      <p:sp>
+        <p:nvSpPr>
+          <p:cNvPr id="14" name="Rectangle 13">
+            <a:extLst>
+              <a:ext uri="{FF2B5EF4-FFF2-40B4-BE49-F238E27FC236}">
+                <a16:creationId xmlns:a16="http://schemas.microsoft.com/office/drawing/2014/main" id="{AF2F604E-43BE-4DC3-B983-E071523364F8}"/>
+              </a:ext>
+              <a:ext uri="{C183D7F6-B498-43B3-948B-1728B52AA6E4}">
+                <adec:decorative xmlns:adec="http://schemas.microsoft.com/office/drawing/2017/decorative" val="1"/>
+              </a:ext>
+            </a:extLst>
+          </p:cNvPr>
+          <p:cNvSpPr>
+            <a:spLocks noGrp="1" noRot="1" noChangeAspect="1" noMove="1" noResize="1" noEditPoints="1" noAdjustHandles="1" noChangeArrowheads="1" noChangeShapeType="1" noTextEdit="1"/>
+          </p:cNvSpPr>
+          <p:nvPr>
+            <p:extLst>
+              <p:ext uri="{386F3935-93C4-4BCD-93E2-E3B085C9AB24}">
+                <p16:designElem xmlns:p16="http://schemas.microsoft.com/office/powerpoint/2015/main" val="1"/>
+              </p:ext>
+            </p:extLst>
+          </p:nvPr>
+        </p:nvSpPr>
+        <p:spPr>
+          <a:xfrm rot="5400000">
+            <a:off x="759921" y="346791"/>
+            <a:ext cx="146304" cy="704088"/>
+          </a:xfrm>
+          <a:prstGeom prst="rect">
+            <a:avLst/>
+          </a:prstGeom>
+          <a:solidFill>
+            <a:schemeClr val="accent2"/>
+          </a:solidFill>
+          <a:ln>
+            <a:noFill/>
+          </a:ln>
+        </p:spPr>
+        <p:style>
+          <a:lnRef idx="2">
+            <a:schemeClr val="accent1">
+              <a:shade val="50000"/>
+            </a:schemeClr>
+          </a:lnRef>
+          <a:fillRef idx="1">
+            <a:schemeClr val="accent1"/>
+          </a:fillRef>
+          <a:effectRef idx="0">
+            <a:schemeClr val="accent1"/>
+          </a:effectRef>
+          <a:fontRef idx="minor">
+            <a:schemeClr val="lt1"/>
+          </a:fontRef>
+        </p:style>
+        <p:txBody>
+          <a:bodyPr rtlCol="0" anchor="ctr"/>
+          <a:lstStyle/>
+          <a:p>
+            <a:pPr algn="ctr"/>
+            <a:endParaRPr lang="en-US">
+              <a:solidFill>
+                <a:prstClr val="white"/>
+              </a:solidFill>
+              <a:latin typeface="Calibri" panose="020F0502020204030204"/>
+            </a:endParaRPr>
+          </a:p>
+        </p:txBody>
+      </p:sp>
+      <p:sp>
+        <p:nvSpPr>
+          <p:cNvPr id="16" name="Rectangle 15">
+            <a:extLst>
+              <a:ext uri="{FF2B5EF4-FFF2-40B4-BE49-F238E27FC236}">
+                <a16:creationId xmlns:a16="http://schemas.microsoft.com/office/drawing/2014/main" id="{08C9B587-E65E-4B52-B37C-ABEBB6E87928}"/>
+              </a:ext>
+              <a:ext uri="{C183D7F6-B498-43B3-948B-1728B52AA6E4}">
+                <adec:decorative xmlns:adec="http://schemas.microsoft.com/office/drawing/2017/decorative" val="1"/>
+              </a:ext>
+            </a:extLst>
+          </p:cNvPr>
+          <p:cNvSpPr>
+            <a:spLocks noGrp="1" noRot="1" noChangeAspect="1" noMove="1" noResize="1" noEditPoints="1" noAdjustHandles="1" noChangeArrowheads="1" noChangeShapeType="1" noTextEdit="1"/>
+          </p:cNvSpPr>
+          <p:nvPr>
+            <p:extLst>
+              <p:ext uri="{386F3935-93C4-4BCD-93E2-E3B085C9AB24}">
+                <p16:designElem xmlns:p16="http://schemas.microsoft.com/office/powerpoint/2015/main" val="1"/>
+              </p:ext>
+            </p:extLst>
+          </p:nvPr>
+        </p:nvSpPr>
+        <p:spPr>
+          <a:xfrm>
+            <a:off x="481029" y="4546920"/>
+            <a:ext cx="3977640" cy="18288"/>
+          </a:xfrm>
+          <a:prstGeom prst="rect">
+            <a:avLst/>
+          </a:prstGeom>
+          <a:solidFill>
+            <a:srgbClr val="D5D5D5"/>
+          </a:solidFill>
+          <a:ln w="3175">
+            <a:noFill/>
+          </a:ln>
+          <a:effectLst/>
+        </p:spPr>
+        <p:style>
+          <a:lnRef idx="2">
+            <a:schemeClr val="accent1">
+              <a:shade val="50000"/>
+            </a:schemeClr>
+          </a:lnRef>
+          <a:fillRef idx="1">
+            <a:schemeClr val="accent1"/>
+          </a:fillRef>
+          <a:effectRef idx="0">
+            <a:schemeClr val="accent1"/>
+          </a:effectRef>
+          <a:fontRef idx="minor">
+            <a:schemeClr val="lt1"/>
+          </a:fontRef>
+        </p:style>
+        <p:txBody>
+          <a:bodyPr rtlCol="0" anchor="ctr"/>
+          <a:lstStyle/>
+          <a:p>
+            <a:pPr marL="0" marR="0" lvl="0" indent="0" algn="ctr" defTabSz="914400" rtl="0" eaLnBrk="1" fontAlgn="auto" latinLnBrk="0" hangingPunct="1">
+              <a:lnSpc>
+                <a:spcPct val="100000"/>
+              </a:lnSpc>
+              <a:spcBef>
+                <a:spcPts val="0"/>
+              </a:spcBef>
+              <a:spcAft>
+                <a:spcPts val="0"/>
+              </a:spcAft>
+              <a:buClrTx/>
+              <a:buSzTx/>
+              <a:buFontTx/>
+              <a:buNone/>
+              <a:tabLst/>
+              <a:defRPr/>
+            </a:pPr>
+            <a:endParaRPr kumimoji="0" lang="en-US" sz="1800" b="0" i="0" u="none" strike="noStrike" kern="1200" cap="none" spc="0" normalizeH="0" baseline="0" noProof="0">
+              <a:ln>
+                <a:noFill/>
+              </a:ln>
+              <a:solidFill>
+                <a:prstClr val="white"/>
+              </a:solidFill>
+              <a:effectLst/>
+              <a:uLnTx/>
+              <a:uFillTx/>
+              <a:latin typeface="Calibri" panose="020F0502020204030204"/>
+              <a:ea typeface="+mn-ea"/>
+              <a:cs typeface="+mn-cs"/>
+            </a:endParaRPr>
+          </a:p>
+        </p:txBody>
+      </p:sp>
       <p:sp>
         <p:nvSpPr>
           <p:cNvPr id="5" name="Subtitle 2">
@@ -3835,6 +4026,14 @@
 <file path=ppt/slides/slide2.xml><?xml version="1.0" encoding="utf-8"?>
 <p:sld xmlns:a="http://schemas.openxmlformats.org/drawingml/2006/main" xmlns:r="http://schemas.openxmlformats.org/officeDocument/2006/relationships" xmlns:p="http://schemas.openxmlformats.org/presentationml/2006/main">
   <p:cSld>
+    <p:bg>
+      <p:bgPr>
+        <a:solidFill>
+          <a:schemeClr val="bg1"/>
+        </a:solidFill>
+        <a:effectLst/>
+      </p:bgPr>
+    </p:bg>
     <p:spTree>
       <p:nvGrpSpPr>
         <p:cNvPr id="1" name=""/>
@@ -3849,12 +4048,261 @@
           <a:chExt cx="0" cy="0"/>
         </a:xfrm>
       </p:grpSpPr>
+      <p:sp useBgFill="1">
+        <p:nvSpPr>
+          <p:cNvPr id="8" name="Rectangle 7">
+            <a:extLst>
+              <a:ext uri="{FF2B5EF4-FFF2-40B4-BE49-F238E27FC236}">
+                <a16:creationId xmlns:a16="http://schemas.microsoft.com/office/drawing/2014/main" id="{DAF1966E-FD40-4A4A-B61B-C4DF7FA05F06}"/>
+              </a:ext>
+              <a:ext uri="{C183D7F6-B498-43B3-948B-1728B52AA6E4}">
+                <adec:decorative xmlns:adec="http://schemas.microsoft.com/office/drawing/2017/decorative" val="1"/>
+              </a:ext>
+            </a:extLst>
+          </p:cNvPr>
+          <p:cNvSpPr>
+            <a:spLocks noGrp="1" noRot="1" noChangeAspect="1" noMove="1" noResize="1" noEditPoints="1" noAdjustHandles="1" noChangeArrowheads="1" noChangeShapeType="1" noTextEdit="1"/>
+          </p:cNvSpPr>
+          <p:nvPr>
+            <p:extLst>
+              <p:ext uri="{386F3935-93C4-4BCD-93E2-E3B085C9AB24}">
+                <p16:designElem xmlns:p16="http://schemas.microsoft.com/office/powerpoint/2015/main" val="1"/>
+              </p:ext>
+            </p:extLst>
+          </p:nvPr>
+        </p:nvSpPr>
+        <p:spPr>
+          <a:xfrm>
+            <a:off x="0" y="0"/>
+            <a:ext cx="12192000" cy="6858000"/>
+          </a:xfrm>
+          <a:prstGeom prst="rect">
+            <a:avLst/>
+          </a:prstGeom>
+          <a:ln>
+            <a:noFill/>
+          </a:ln>
+        </p:spPr>
+        <p:style>
+          <a:lnRef idx="2">
+            <a:schemeClr val="accent1">
+              <a:shade val="50000"/>
+            </a:schemeClr>
+          </a:lnRef>
+          <a:fillRef idx="1">
+            <a:schemeClr val="accent1"/>
+          </a:fillRef>
+          <a:effectRef idx="0">
+            <a:schemeClr val="accent1"/>
+          </a:effectRef>
+          <a:fontRef idx="minor">
+            <a:schemeClr val="lt1"/>
+          </a:fontRef>
+        </p:style>
+        <p:txBody>
+          <a:bodyPr rtlCol="0" anchor="ctr"/>
+          <a:lstStyle/>
+          <a:p>
+            <a:pPr algn="ctr"/>
+            <a:endParaRPr lang="en-US"/>
+          </a:p>
+        </p:txBody>
+      </p:sp>
+      <p:sp useBgFill="1">
+        <p:nvSpPr>
+          <p:cNvPr id="10" name="Rectangle 9">
+            <a:extLst>
+              <a:ext uri="{FF2B5EF4-FFF2-40B4-BE49-F238E27FC236}">
+                <a16:creationId xmlns:a16="http://schemas.microsoft.com/office/drawing/2014/main" id="{047BFA19-D45E-416B-A404-7AF2F3F27017}"/>
+              </a:ext>
+              <a:ext uri="{C183D7F6-B498-43B3-948B-1728B52AA6E4}">
+                <adec:decorative xmlns:adec="http://schemas.microsoft.com/office/drawing/2017/decorative" val="1"/>
+              </a:ext>
+            </a:extLst>
+          </p:cNvPr>
+          <p:cNvSpPr>
+            <a:spLocks noGrp="1" noRot="1" noChangeAspect="1" noMove="1" noResize="1" noEditPoints="1" noAdjustHandles="1" noChangeArrowheads="1" noChangeShapeType="1" noTextEdit="1"/>
+          </p:cNvSpPr>
+          <p:nvPr>
+            <p:extLst>
+              <p:ext uri="{386F3935-93C4-4BCD-93E2-E3B085C9AB24}">
+                <p16:designElem xmlns:p16="http://schemas.microsoft.com/office/powerpoint/2015/main" val="1"/>
+              </p:ext>
+            </p:extLst>
+          </p:nvPr>
+        </p:nvSpPr>
+        <p:spPr>
+          <a:xfrm>
+            <a:off x="558209" y="0"/>
+            <a:ext cx="11167447" cy="2018806"/>
+          </a:xfrm>
+          <a:prstGeom prst="rect">
+            <a:avLst/>
+          </a:prstGeom>
+          <a:ln w="9525">
+            <a:solidFill>
+              <a:srgbClr val="E1E1E1"/>
+            </a:solidFill>
+          </a:ln>
+          <a:effectLst>
+            <a:outerShdw blurRad="50800" dist="38100" dir="2700000" algn="tl" rotWithShape="0">
+              <a:schemeClr val="bg1">
+                <a:lumMod val="85000"/>
+                <a:alpha val="50000"/>
+              </a:schemeClr>
+            </a:outerShdw>
+          </a:effectLst>
+        </p:spPr>
+        <p:style>
+          <a:lnRef idx="2">
+            <a:schemeClr val="accent1">
+              <a:shade val="50000"/>
+            </a:schemeClr>
+          </a:lnRef>
+          <a:fillRef idx="1">
+            <a:schemeClr val="accent1"/>
+          </a:fillRef>
+          <a:effectRef idx="0">
+            <a:schemeClr val="accent1"/>
+          </a:effectRef>
+          <a:fontRef idx="minor">
+            <a:schemeClr val="lt1"/>
+          </a:fontRef>
+        </p:style>
+        <p:txBody>
+          <a:bodyPr rtlCol="0" anchor="ctr"/>
+          <a:lstStyle/>
+          <a:p>
+            <a:pPr marL="0" marR="0" lvl="0" indent="0" algn="ctr" defTabSz="914400" rtl="0" eaLnBrk="1" fontAlgn="auto" latinLnBrk="0" hangingPunct="1">
+              <a:lnSpc>
+                <a:spcPct val="100000"/>
+              </a:lnSpc>
+              <a:spcBef>
+                <a:spcPts val="0"/>
+              </a:spcBef>
+              <a:spcAft>
+                <a:spcPts val="0"/>
+              </a:spcAft>
+              <a:buClrTx/>
+              <a:buSzTx/>
+              <a:buFontTx/>
+              <a:buNone/>
+              <a:tabLst/>
+              <a:defRPr/>
+            </a:pPr>
+            <a:endParaRPr kumimoji="0" lang="en-US" sz="1800" b="0" i="0" u="none" strike="noStrike" kern="1200" cap="none" spc="0" normalizeH="0" baseline="0" noProof="0">
+              <a:ln>
+                <a:noFill/>
+              </a:ln>
+              <a:solidFill>
+                <a:prstClr val="white"/>
+              </a:solidFill>
+              <a:effectLst/>
+              <a:uLnTx/>
+              <a:uFillTx/>
+              <a:latin typeface="Calibri" panose="020F0502020204030204"/>
+              <a:ea typeface="+mn-ea"/>
+              <a:cs typeface="+mn-cs"/>
+            </a:endParaRPr>
+          </a:p>
+        </p:txBody>
+      </p:sp>
+      <p:sp useBgFill="1">
+        <p:nvSpPr>
+          <p:cNvPr id="12" name="Rectangle 11">
+            <a:extLst>
+              <a:ext uri="{FF2B5EF4-FFF2-40B4-BE49-F238E27FC236}">
+                <a16:creationId xmlns:a16="http://schemas.microsoft.com/office/drawing/2014/main" id="{8E0105E7-23DB-4CF2-8258-FF47C7620F6E}"/>
+              </a:ext>
+              <a:ext uri="{C183D7F6-B498-43B3-948B-1728B52AA6E4}">
+                <adec:decorative xmlns:adec="http://schemas.microsoft.com/office/drawing/2017/decorative" val="1"/>
+              </a:ext>
+            </a:extLst>
+          </p:cNvPr>
+          <p:cNvSpPr>
+            <a:spLocks noGrp="1" noRot="1" noChangeAspect="1" noMove="1" noResize="1" noEditPoints="1" noAdjustHandles="1" noChangeArrowheads="1" noChangeShapeType="1" noTextEdit="1"/>
+          </p:cNvSpPr>
+          <p:nvPr>
+            <p:extLst>
+              <p:ext uri="{386F3935-93C4-4BCD-93E2-E3B085C9AB24}">
+                <p16:designElem xmlns:p16="http://schemas.microsoft.com/office/powerpoint/2015/main" val="1"/>
+              </p:ext>
+            </p:extLst>
+          </p:nvPr>
+        </p:nvSpPr>
+        <p:spPr>
+          <a:xfrm>
+            <a:off x="566928" y="0"/>
+            <a:ext cx="11155680" cy="2011680"/>
+          </a:xfrm>
+          <a:prstGeom prst="rect">
+            <a:avLst/>
+          </a:prstGeom>
+          <a:ln w="9525">
+            <a:noFill/>
+          </a:ln>
+          <a:effectLst/>
+        </p:spPr>
+        <p:style>
+          <a:lnRef idx="2">
+            <a:schemeClr val="accent1">
+              <a:shade val="50000"/>
+            </a:schemeClr>
+          </a:lnRef>
+          <a:fillRef idx="1">
+            <a:schemeClr val="accent1"/>
+          </a:fillRef>
+          <a:effectRef idx="0">
+            <a:schemeClr val="accent1"/>
+          </a:effectRef>
+          <a:fontRef idx="minor">
+            <a:schemeClr val="lt1"/>
+          </a:fontRef>
+        </p:style>
+        <p:txBody>
+          <a:bodyPr rtlCol="0" anchor="ctr"/>
+          <a:lstStyle/>
+          <a:p>
+            <a:pPr marL="0" marR="0" lvl="0" indent="0" algn="ctr" defTabSz="914400" rtl="0" eaLnBrk="1" fontAlgn="auto" latinLnBrk="0" hangingPunct="1">
+              <a:lnSpc>
+                <a:spcPct val="100000"/>
+              </a:lnSpc>
+              <a:spcBef>
+                <a:spcPts val="0"/>
+              </a:spcBef>
+              <a:spcAft>
+                <a:spcPts val="0"/>
+              </a:spcAft>
+              <a:buClrTx/>
+              <a:buSzTx/>
+              <a:buFontTx/>
+              <a:buNone/>
+              <a:tabLst/>
+              <a:defRPr/>
+            </a:pPr>
+            <a:endParaRPr kumimoji="0" lang="en-US" sz="1800" b="0" i="0" u="none" strike="noStrike" kern="1200" cap="none" spc="0" normalizeH="0" baseline="0" noProof="0">
+              <a:ln>
+                <a:noFill/>
+              </a:ln>
+              <a:solidFill>
+                <a:prstClr val="white"/>
+              </a:solidFill>
+              <a:effectLst/>
+              <a:uLnTx/>
+              <a:uFillTx/>
+              <a:latin typeface="Calibri" panose="020F0502020204030204"/>
+              <a:ea typeface="+mn-ea"/>
+              <a:cs typeface="+mn-cs"/>
+            </a:endParaRPr>
+          </a:p>
+        </p:txBody>
+      </p:sp>
       <p:sp>
         <p:nvSpPr>
           <p:cNvPr id="2" name="Title 1">
             <a:extLst>
               <a:ext uri="{FF2B5EF4-FFF2-40B4-BE49-F238E27FC236}">
-                <a16:creationId xmlns:a16="http://schemas.microsoft.com/office/drawing/2014/main" id="{13ACE0C6-936F-0592-1808-41770DFD6C28}"/>
+                <a16:creationId xmlns:a16="http://schemas.microsoft.com/office/drawing/2014/main" id="{3BE19597-ABC8-97F3-5AF6-2821F17A9C29}"/>
               </a:ext>
             </a:extLst>
           </p:cNvPr>
@@ -3865,12 +4313,87 @@
             <p:ph type="title"/>
           </p:nvPr>
         </p:nvSpPr>
-        <p:spPr/>
-        <p:txBody>
-          <a:bodyPr/>
-          <a:lstStyle/>
-          <a:p>
-            <a:endParaRPr lang="en-US" dirty="0"/>
+        <p:spPr>
+          <a:xfrm>
+            <a:off x="1115568" y="548640"/>
+            <a:ext cx="10168128" cy="1179576"/>
+          </a:xfrm>
+        </p:spPr>
+        <p:txBody>
+          <a:bodyPr>
+            <a:normAutofit/>
+          </a:bodyPr>
+          <a:lstStyle/>
+          <a:p>
+            <a:endParaRPr lang="en-US" sz="4000" dirty="0"/>
+          </a:p>
+        </p:txBody>
+      </p:sp>
+      <p:sp>
+        <p:nvSpPr>
+          <p:cNvPr id="14" name="Rectangle 13">
+            <a:extLst>
+              <a:ext uri="{FF2B5EF4-FFF2-40B4-BE49-F238E27FC236}">
+                <a16:creationId xmlns:a16="http://schemas.microsoft.com/office/drawing/2014/main" id="{074B4F7D-14B2-478B-8BF5-01E4E0C5D263}"/>
+              </a:ext>
+              <a:ext uri="{C183D7F6-B498-43B3-948B-1728B52AA6E4}">
+                <adec:decorative xmlns:adec="http://schemas.microsoft.com/office/drawing/2017/decorative" val="1"/>
+              </a:ext>
+            </a:extLst>
+          </p:cNvPr>
+          <p:cNvSpPr>
+            <a:spLocks noGrp="1" noRot="1" noChangeAspect="1" noMove="1" noResize="1" noEditPoints="1" noAdjustHandles="1" noChangeArrowheads="1" noChangeShapeType="1" noTextEdit="1"/>
+          </p:cNvSpPr>
+          <p:nvPr>
+            <p:extLst>
+              <p:ext uri="{386F3935-93C4-4BCD-93E2-E3B085C9AB24}">
+                <p16:designElem xmlns:p16="http://schemas.microsoft.com/office/powerpoint/2015/main" val="1"/>
+              </p:ext>
+            </p:extLst>
+          </p:nvPr>
+        </p:nvSpPr>
+        <p:spPr>
+          <a:xfrm>
+            <a:off x="498834" y="758952"/>
+            <a:ext cx="128016" cy="704088"/>
+          </a:xfrm>
+          <a:prstGeom prst="rect">
+            <a:avLst/>
+          </a:prstGeom>
+          <a:solidFill>
+            <a:schemeClr val="accent2"/>
+          </a:solidFill>
+          <a:ln>
+            <a:noFill/>
+          </a:ln>
+        </p:spPr>
+        <p:style>
+          <a:lnRef idx="2">
+            <a:schemeClr val="accent1">
+              <a:shade val="50000"/>
+            </a:schemeClr>
+          </a:lnRef>
+          <a:fillRef idx="1">
+            <a:schemeClr val="accent1"/>
+          </a:fillRef>
+          <a:effectRef idx="0">
+            <a:schemeClr val="accent1"/>
+          </a:effectRef>
+          <a:fontRef idx="minor">
+            <a:schemeClr val="lt1"/>
+          </a:fontRef>
+        </p:style>
+        <p:txBody>
+          <a:bodyPr rtlCol="0" anchor="ctr"/>
+          <a:lstStyle/>
+          <a:p>
+            <a:pPr algn="ctr"/>
+            <a:endParaRPr lang="en-US">
+              <a:solidFill>
+                <a:prstClr val="white"/>
+              </a:solidFill>
+              <a:latin typeface="Calibri" panose="020F0502020204030204"/>
+            </a:endParaRPr>
           </a:p>
         </p:txBody>
       </p:sp>
@@ -3879,7 +4402,7 @@
           <p:cNvPr id="3" name="Content Placeholder 2">
             <a:extLst>
               <a:ext uri="{FF2B5EF4-FFF2-40B4-BE49-F238E27FC236}">
-                <a16:creationId xmlns:a16="http://schemas.microsoft.com/office/drawing/2014/main" id="{4634517D-6B64-D870-3D06-4FD756D0FC4D}"/>
+                <a16:creationId xmlns:a16="http://schemas.microsoft.com/office/drawing/2014/main" id="{E7BA7103-981C-CF33-C768-D5C12CC2FB93}"/>
               </a:ext>
             </a:extLst>
           </p:cNvPr>
@@ -3890,179 +4413,26 @@
             <p:ph idx="1"/>
           </p:nvPr>
         </p:nvSpPr>
-        <p:spPr/>
-        <p:txBody>
-          <a:bodyPr/>
-          <a:lstStyle/>
-          <a:p>
-            <a:endParaRPr lang="en-US"/>
+        <p:spPr>
+          <a:xfrm>
+            <a:off x="1115568" y="2481943"/>
+            <a:ext cx="10168128" cy="3695020"/>
+          </a:xfrm>
+        </p:spPr>
+        <p:txBody>
+          <a:bodyPr>
+            <a:normAutofit/>
+          </a:bodyPr>
+          <a:lstStyle/>
+          <a:p>
+            <a:endParaRPr lang="en-US" sz="2200" dirty="0"/>
           </a:p>
         </p:txBody>
       </p:sp>
     </p:spTree>
     <p:extLst>
       <p:ext uri="{BB962C8B-B14F-4D97-AF65-F5344CB8AC3E}">
-        <p14:creationId xmlns:p14="http://schemas.microsoft.com/office/powerpoint/2010/main" val="1665583316"/>
-      </p:ext>
-    </p:extLst>
-  </p:cSld>
-  <p:clrMapOvr>
-    <a:masterClrMapping/>
-  </p:clrMapOvr>
-</p:sld>
-</file>
-
-<file path=ppt/slides/slide3.xml><?xml version="1.0" encoding="utf-8"?>
-<p:sld xmlns:a="http://schemas.openxmlformats.org/drawingml/2006/main" xmlns:r="http://schemas.openxmlformats.org/officeDocument/2006/relationships" xmlns:p="http://schemas.openxmlformats.org/presentationml/2006/main">
-  <p:cSld>
-    <p:spTree>
-      <p:nvGrpSpPr>
-        <p:cNvPr id="1" name=""/>
-        <p:cNvGrpSpPr/>
-        <p:nvPr/>
-      </p:nvGrpSpPr>
-      <p:grpSpPr>
-        <a:xfrm>
-          <a:off x="0" y="0"/>
-          <a:ext cx="0" cy="0"/>
-          <a:chOff x="0" y="0"/>
-          <a:chExt cx="0" cy="0"/>
-        </a:xfrm>
-      </p:grpSpPr>
-      <p:sp>
-        <p:nvSpPr>
-          <p:cNvPr id="2" name="Title 1">
-            <a:extLst>
-              <a:ext uri="{FF2B5EF4-FFF2-40B4-BE49-F238E27FC236}">
-                <a16:creationId xmlns:a16="http://schemas.microsoft.com/office/drawing/2014/main" id="{14B39110-E970-63E5-87EA-CB4B515596A8}"/>
-              </a:ext>
-            </a:extLst>
-          </p:cNvPr>
-          <p:cNvSpPr>
-            <a:spLocks noGrp="1"/>
-          </p:cNvSpPr>
-          <p:nvPr>
-            <p:ph type="title"/>
-          </p:nvPr>
-        </p:nvSpPr>
-        <p:spPr/>
-        <p:txBody>
-          <a:bodyPr/>
-          <a:lstStyle/>
-          <a:p>
-            <a:endParaRPr lang="en-US"/>
-          </a:p>
-        </p:txBody>
-      </p:sp>
-      <p:sp>
-        <p:nvSpPr>
-          <p:cNvPr id="3" name="Content Placeholder 2">
-            <a:extLst>
-              <a:ext uri="{FF2B5EF4-FFF2-40B4-BE49-F238E27FC236}">
-                <a16:creationId xmlns:a16="http://schemas.microsoft.com/office/drawing/2014/main" id="{267F19BB-9447-D3A8-8580-5C182D31054F}"/>
-              </a:ext>
-            </a:extLst>
-          </p:cNvPr>
-          <p:cNvSpPr>
-            <a:spLocks noGrp="1"/>
-          </p:cNvSpPr>
-          <p:nvPr>
-            <p:ph idx="1"/>
-          </p:nvPr>
-        </p:nvSpPr>
-        <p:spPr/>
-        <p:txBody>
-          <a:bodyPr/>
-          <a:lstStyle/>
-          <a:p>
-            <a:endParaRPr lang="en-US"/>
-          </a:p>
-        </p:txBody>
-      </p:sp>
-    </p:spTree>
-    <p:extLst>
-      <p:ext uri="{BB962C8B-B14F-4D97-AF65-F5344CB8AC3E}">
-        <p14:creationId xmlns:p14="http://schemas.microsoft.com/office/powerpoint/2010/main" val="2996831606"/>
-      </p:ext>
-    </p:extLst>
-  </p:cSld>
-  <p:clrMapOvr>
-    <a:masterClrMapping/>
-  </p:clrMapOvr>
-</p:sld>
-</file>
-
-<file path=ppt/slides/slide4.xml><?xml version="1.0" encoding="utf-8"?>
-<p:sld xmlns:a="http://schemas.openxmlformats.org/drawingml/2006/main" xmlns:r="http://schemas.openxmlformats.org/officeDocument/2006/relationships" xmlns:p="http://schemas.openxmlformats.org/presentationml/2006/main">
-  <p:cSld>
-    <p:spTree>
-      <p:nvGrpSpPr>
-        <p:cNvPr id="1" name=""/>
-        <p:cNvGrpSpPr/>
-        <p:nvPr/>
-      </p:nvGrpSpPr>
-      <p:grpSpPr>
-        <a:xfrm>
-          <a:off x="0" y="0"/>
-          <a:ext cx="0" cy="0"/>
-          <a:chOff x="0" y="0"/>
-          <a:chExt cx="0" cy="0"/>
-        </a:xfrm>
-      </p:grpSpPr>
-      <p:sp>
-        <p:nvSpPr>
-          <p:cNvPr id="2" name="Title 1">
-            <a:extLst>
-              <a:ext uri="{FF2B5EF4-FFF2-40B4-BE49-F238E27FC236}">
-                <a16:creationId xmlns:a16="http://schemas.microsoft.com/office/drawing/2014/main" id="{C854E0C5-8467-2CA0-B311-7F23577583D4}"/>
-              </a:ext>
-            </a:extLst>
-          </p:cNvPr>
-          <p:cNvSpPr>
-            <a:spLocks noGrp="1"/>
-          </p:cNvSpPr>
-          <p:nvPr>
-            <p:ph type="title"/>
-          </p:nvPr>
-        </p:nvSpPr>
-        <p:spPr/>
-        <p:txBody>
-          <a:bodyPr/>
-          <a:lstStyle/>
-          <a:p>
-            <a:endParaRPr lang="en-US"/>
-          </a:p>
-        </p:txBody>
-      </p:sp>
-      <p:sp>
-        <p:nvSpPr>
-          <p:cNvPr id="3" name="Content Placeholder 2">
-            <a:extLst>
-              <a:ext uri="{FF2B5EF4-FFF2-40B4-BE49-F238E27FC236}">
-                <a16:creationId xmlns:a16="http://schemas.microsoft.com/office/drawing/2014/main" id="{7DA98F60-42E6-4A45-BCD0-57D15C9AC8B3}"/>
-              </a:ext>
-            </a:extLst>
-          </p:cNvPr>
-          <p:cNvSpPr>
-            <a:spLocks noGrp="1"/>
-          </p:cNvSpPr>
-          <p:nvPr>
-            <p:ph idx="1"/>
-          </p:nvPr>
-        </p:nvSpPr>
-        <p:spPr/>
-        <p:txBody>
-          <a:bodyPr/>
-          <a:lstStyle/>
-          <a:p>
-            <a:endParaRPr lang="en-US"/>
-          </a:p>
-        </p:txBody>
-      </p:sp>
-    </p:spTree>
-    <p:extLst>
-      <p:ext uri="{BB962C8B-B14F-4D97-AF65-F5344CB8AC3E}">
-        <p14:creationId xmlns:p14="http://schemas.microsoft.com/office/powerpoint/2010/main" val="2736931466"/>
+        <p14:creationId xmlns:p14="http://schemas.microsoft.com/office/powerpoint/2010/main" val="4219064168"/>
       </p:ext>
     </p:extLst>
   </p:cSld>
@@ -4073,9 +4443,9 @@
 </file>
 
 <file path=ppt/theme/theme1.xml><?xml version="1.0" encoding="utf-8"?>
-<a:theme xmlns:a="http://schemas.openxmlformats.org/drawingml/2006/main" name="VanillaVTI">
+<a:theme xmlns:a="http://schemas.openxmlformats.org/drawingml/2006/main" name="Office Theme">
   <a:themeElements>
-    <a:clrScheme name="Vanilla">
+    <a:clrScheme name="Office">
       <a:dk1>
         <a:sysClr val="windowText" lastClr="000000"/>
       </a:dk1>
@@ -4083,46 +4453,140 @@
         <a:sysClr val="window" lastClr="FFFFFF"/>
       </a:lt1>
       <a:dk2>
-        <a:srgbClr val="2C3932"/>
+        <a:srgbClr val="0E2841"/>
       </a:dk2>
       <a:lt2>
-        <a:srgbClr val="FDF6EA"/>
+        <a:srgbClr val="E8E8E8"/>
       </a:lt2>
       <a:accent1>
-        <a:srgbClr val="169C9A"/>
+        <a:srgbClr val="156082"/>
       </a:accent1>
       <a:accent2>
-        <a:srgbClr val="FA9A42"/>
+        <a:srgbClr val="E97132"/>
       </a:accent2>
       <a:accent3>
-        <a:srgbClr val="E15C3D"/>
+        <a:srgbClr val="196B24"/>
       </a:accent3>
       <a:accent4>
-        <a:srgbClr val="E78A67"/>
+        <a:srgbClr val="0F9ED5"/>
       </a:accent4>
       <a:accent5>
-        <a:srgbClr val="A74B40"/>
+        <a:srgbClr val="A02B93"/>
       </a:accent5>
       <a:accent6>
-        <a:srgbClr val="3D9072"/>
+        <a:srgbClr val="4EA72E"/>
       </a:accent6>
       <a:hlink>
-        <a:srgbClr val="169C9A"/>
+        <a:srgbClr val="467886"/>
       </a:hlink>
       <a:folHlink>
-        <a:srgbClr val="E15C3D"/>
+        <a:srgbClr val="96607D"/>
       </a:folHlink>
     </a:clrScheme>
-    <a:fontScheme name="Neue Haas">
+    <a:fontScheme name="Office">
       <a:majorFont>
-        <a:latin typeface="Neue Haas Grotesk Text Pro"/>
+        <a:latin typeface="Aptos Display" panose="02110004020202020204"/>
         <a:ea typeface=""/>
         <a:cs typeface=""/>
+        <a:font script="Jpan" typeface="游ゴシック Light"/>
+        <a:font script="Hang" typeface="맑은 고딕"/>
+        <a:font script="Hans" typeface="等线 Light"/>
+        <a:font script="Hant" typeface="新細明體"/>
+        <a:font script="Arab" typeface="Times New Roman"/>
+        <a:font script="Hebr" typeface="Times New Roman"/>
+        <a:font script="Thai" typeface="Angsana New"/>
+        <a:font script="Ethi" typeface="Nyala"/>
+        <a:font script="Beng" typeface="Vrinda"/>
+        <a:font script="Gujr" typeface="Shruti"/>
+        <a:font script="Khmr" typeface="MoolBoran"/>
+        <a:font script="Knda" typeface="Tunga"/>
+        <a:font script="Guru" typeface="Raavi"/>
+        <a:font script="Cans" typeface="Euphemia"/>
+        <a:font script="Cher" typeface="Plantagenet Cherokee"/>
+        <a:font script="Yiii" typeface="Microsoft Yi Baiti"/>
+        <a:font script="Tibt" typeface="Microsoft Himalaya"/>
+        <a:font script="Thaa" typeface="MV Boli"/>
+        <a:font script="Deva" typeface="Mangal"/>
+        <a:font script="Telu" typeface="Gautami"/>
+        <a:font script="Taml" typeface="Latha"/>
+        <a:font script="Syrc" typeface="Estrangelo Edessa"/>
+        <a:font script="Orya" typeface="Kalinga"/>
+        <a:font script="Mlym" typeface="Kartika"/>
+        <a:font script="Laoo" typeface="DokChampa"/>
+        <a:font script="Sinh" typeface="Iskoola Pota"/>
+        <a:font script="Mong" typeface="Mongolian Baiti"/>
+        <a:font script="Viet" typeface="Times New Roman"/>
+        <a:font script="Uigh" typeface="Microsoft Uighur"/>
+        <a:font script="Geor" typeface="Sylfaen"/>
+        <a:font script="Armn" typeface="Arial"/>
+        <a:font script="Bugi" typeface="Leelawadee UI"/>
+        <a:font script="Bopo" typeface="Microsoft JhengHei"/>
+        <a:font script="Java" typeface="Javanese Text"/>
+        <a:font script="Lisu" typeface="Segoe UI"/>
+        <a:font script="Mymr" typeface="Myanmar Text"/>
+        <a:font script="Nkoo" typeface="Ebrima"/>
+        <a:font script="Olck" typeface="Nirmala UI"/>
+        <a:font script="Osma" typeface="Ebrima"/>
+        <a:font script="Phag" typeface="Phagspa"/>
+        <a:font script="Syrn" typeface="Estrangelo Edessa"/>
+        <a:font script="Syrj" typeface="Estrangelo Edessa"/>
+        <a:font script="Syre" typeface="Estrangelo Edessa"/>
+        <a:font script="Sora" typeface="Nirmala UI"/>
+        <a:font script="Tale" typeface="Microsoft Tai Le"/>
+        <a:font script="Talu" typeface="Microsoft New Tai Lue"/>
+        <a:font script="Tfng" typeface="Ebrima"/>
       </a:majorFont>
       <a:minorFont>
-        <a:latin typeface="Neue Haas Grotesk Text Pro"/>
+        <a:latin typeface="Aptos" panose="02110004020202020204"/>
         <a:ea typeface=""/>
         <a:cs typeface=""/>
+        <a:font script="Jpan" typeface="游ゴシック"/>
+        <a:font script="Hang" typeface="맑은 고딕"/>
+        <a:font script="Hans" typeface="等线"/>
+        <a:font script="Hant" typeface="新細明體"/>
+        <a:font script="Arab" typeface="Arial"/>
+        <a:font script="Hebr" typeface="Arial"/>
+        <a:font script="Thai" typeface="Cordia New"/>
+        <a:font script="Ethi" typeface="Nyala"/>
+        <a:font script="Beng" typeface="Vrinda"/>
+        <a:font script="Gujr" typeface="Shruti"/>
+        <a:font script="Khmr" typeface="DaunPenh"/>
+        <a:font script="Knda" typeface="Tunga"/>
+        <a:font script="Guru" typeface="Raavi"/>
+        <a:font script="Cans" typeface="Euphemia"/>
+        <a:font script="Cher" typeface="Plantagenet Cherokee"/>
+        <a:font script="Yiii" typeface="Microsoft Yi Baiti"/>
+        <a:font script="Tibt" typeface="Microsoft Himalaya"/>
+        <a:font script="Thaa" typeface="MV Boli"/>
+        <a:font script="Deva" typeface="Mangal"/>
+        <a:font script="Telu" typeface="Gautami"/>
+        <a:font script="Taml" typeface="Latha"/>
+        <a:font script="Syrc" typeface="Estrangelo Edessa"/>
+        <a:font script="Orya" typeface="Kalinga"/>
+        <a:font script="Mlym" typeface="Kartika"/>
+        <a:font script="Laoo" typeface="DokChampa"/>
+        <a:font script="Sinh" typeface="Iskoola Pota"/>
+        <a:font script="Mong" typeface="Mongolian Baiti"/>
+        <a:font script="Viet" typeface="Arial"/>
+        <a:font script="Uigh" typeface="Microsoft Uighur"/>
+        <a:font script="Geor" typeface="Sylfaen"/>
+        <a:font script="Armn" typeface="Arial"/>
+        <a:font script="Bugi" typeface="Leelawadee UI"/>
+        <a:font script="Bopo" typeface="Microsoft JhengHei"/>
+        <a:font script="Java" typeface="Javanese Text"/>
+        <a:font script="Lisu" typeface="Segoe UI"/>
+        <a:font script="Mymr" typeface="Myanmar Text"/>
+        <a:font script="Nkoo" typeface="Ebrima"/>
+        <a:font script="Olck" typeface="Nirmala UI"/>
+        <a:font script="Osma" typeface="Ebrima"/>
+        <a:font script="Phag" typeface="Phagspa"/>
+        <a:font script="Syrn" typeface="Estrangelo Edessa"/>
+        <a:font script="Syrj" typeface="Estrangelo Edessa"/>
+        <a:font script="Syre" typeface="Estrangelo Edessa"/>
+        <a:font script="Sora" typeface="Nirmala UI"/>
+        <a:font script="Tale" typeface="Microsoft Tai Le"/>
+        <a:font script="Talu" typeface="Microsoft New Tai Lue"/>
+        <a:font script="Tfng" typeface="Ebrima"/>
       </a:minorFont>
     </a:fontScheme>
     <a:fmtScheme name="Office">
@@ -4184,13 +4648,6 @@
         </a:gradFill>
       </a:fillStyleLst>
       <a:lnStyleLst>
-        <a:ln w="6350" cap="flat" cmpd="sng" algn="ctr">
-          <a:solidFill>
-            <a:schemeClr val="phClr"/>
-          </a:solidFill>
-          <a:prstDash val="solid"/>
-          <a:miter lim="800000"/>
-        </a:ln>
         <a:ln w="12700" cap="flat" cmpd="sng" algn="ctr">
           <a:solidFill>
             <a:schemeClr val="phClr"/>
@@ -4199,6 +4656,13 @@
           <a:miter lim="800000"/>
         </a:ln>
         <a:ln w="19050" cap="flat" cmpd="sng" algn="ctr">
+          <a:solidFill>
+            <a:schemeClr val="phClr"/>
+          </a:solidFill>
+          <a:prstDash val="solid"/>
+          <a:miter lim="800000"/>
+        </a:ln>
+        <a:ln w="25400" cap="flat" cmpd="sng" algn="ctr">
           <a:solidFill>
             <a:schemeClr val="phClr"/>
           </a:solidFill>
@@ -4263,11 +4727,31 @@
       </a:bgFillStyleLst>
     </a:fmtScheme>
   </a:themeElements>
-  <a:objectDefaults/>
+  <a:objectDefaults>
+    <a:lnDef>
+      <a:spPr/>
+      <a:bodyPr/>
+      <a:lstStyle/>
+      <a:style>
+        <a:lnRef idx="2">
+          <a:schemeClr val="accent1"/>
+        </a:lnRef>
+        <a:fillRef idx="0">
+          <a:schemeClr val="accent1"/>
+        </a:fillRef>
+        <a:effectRef idx="1">
+          <a:schemeClr val="accent1"/>
+        </a:effectRef>
+        <a:fontRef idx="minor">
+          <a:schemeClr val="tx1"/>
+        </a:fontRef>
+      </a:style>
+    </a:lnDef>
+  </a:objectDefaults>
   <a:extraClrSchemeLst/>
   <a:extLst>
     <a:ext uri="{05A4C25C-085E-4340-85A3-A5531E510DB2}">
-      <thm15:themeFamily xmlns:thm15="http://schemas.microsoft.com/office/thememl/2012/main" name="VanillaVTI" id="{54D376C6-1C9B-4C6B-8F3C-483BB307BB05}" vid="{7690D8A9-C071-45EF-BA7A-F7FA9779B11D}"/>
+      <thm15:themeFamily xmlns:thm15="http://schemas.microsoft.com/office/thememl/2012/main" name="Office Theme" id="{2E142A2C-CD16-42D6-873A-C26D2A0506FA}" vid="{1BDDFF52-6CD6-40A5-AB3C-68EB2F1E4D0A}"/>
     </a:ext>
   </a:extLst>
 </a:theme>

</xml_diff>